<commit_message>
Desenho da Solução Atualizado
</commit_message>
<xml_diff>
--- a/Documentação/Desenho_Solução.pptx
+++ b/Documentação/Desenho_Solução.pptx
@@ -4,6 +4,9 @@
   <p:sldMasterIdLst>
     <p:sldMasterId id="2147483648" r:id="rId1"/>
   </p:sldMasterIdLst>
+  <p:notesMasterIdLst>
+    <p:notesMasterId r:id="rId3"/>
+  </p:notesMasterIdLst>
   <p:sldIdLst>
     <p:sldId id="258" r:id="rId2"/>
   </p:sldIdLst>
@@ -112,6 +115,503 @@
 </p:presentation>
 </file>
 
+<file path=ppt/notesMasters/notesMaster1.xml><?xml version="1.0" encoding="utf-8"?>
+<p:notesMaster xmlns:a="http://schemas.openxmlformats.org/drawingml/2006/main" xmlns:r="http://schemas.openxmlformats.org/officeDocument/2006/relationships" xmlns:p="http://schemas.openxmlformats.org/presentationml/2006/main">
+  <p:cSld>
+    <p:bg>
+      <p:bgRef idx="1001">
+        <a:schemeClr val="bg1"/>
+      </p:bgRef>
+    </p:bg>
+    <p:spTree>
+      <p:nvGrpSpPr>
+        <p:cNvPr id="1" name=""/>
+        <p:cNvGrpSpPr/>
+        <p:nvPr/>
+      </p:nvGrpSpPr>
+      <p:grpSpPr>
+        <a:xfrm>
+          <a:off x="0" y="0"/>
+          <a:ext cx="0" cy="0"/>
+          <a:chOff x="0" y="0"/>
+          <a:chExt cx="0" cy="0"/>
+        </a:xfrm>
+      </p:grpSpPr>
+      <p:sp>
+        <p:nvSpPr>
+          <p:cNvPr id="2" name="Espaço Reservado para Cabeçalho 1">
+            <a:extLst>
+              <a:ext uri="{FF2B5EF4-FFF2-40B4-BE49-F238E27FC236}">
+                <a16:creationId xmlns:a16="http://schemas.microsoft.com/office/drawing/2014/main" id="{F3EB7F3F-8F0A-46F5-A56C-02F01E222E83}"/>
+              </a:ext>
+            </a:extLst>
+          </p:cNvPr>
+          <p:cNvSpPr>
+            <a:spLocks noGrp="1"/>
+          </p:cNvSpPr>
+          <p:nvPr>
+            <p:ph type="hdr" sz="quarter"/>
+          </p:nvPr>
+        </p:nvSpPr>
+        <p:spPr>
+          <a:xfrm>
+            <a:off x="0" y="0"/>
+            <a:ext cx="2971800" cy="458788"/>
+          </a:xfrm>
+          <a:prstGeom prst="rect">
+            <a:avLst/>
+          </a:prstGeom>
+        </p:spPr>
+        <p:txBody>
+          <a:bodyPr vert="horz" lIns="91440" tIns="45720" rIns="91440" bIns="45720" rtlCol="0"/>
+          <a:lstStyle>
+            <a:lvl1pPr algn="l">
+              <a:defRPr sz="1200"/>
+            </a:lvl1pPr>
+          </a:lstStyle>
+          <a:p>
+            <a:endParaRPr lang="pt-BR"/>
+          </a:p>
+        </p:txBody>
+      </p:sp>
+      <p:sp>
+        <p:nvSpPr>
+          <p:cNvPr id="3" name="Espaço Reservado para Data 2">
+            <a:extLst>
+              <a:ext uri="{FF2B5EF4-FFF2-40B4-BE49-F238E27FC236}">
+                <a16:creationId xmlns:a16="http://schemas.microsoft.com/office/drawing/2014/main" id="{8C4A83FF-7535-4B1E-BFCE-FAC5C81DB265}"/>
+              </a:ext>
+            </a:extLst>
+          </p:cNvPr>
+          <p:cNvSpPr>
+            <a:spLocks noGrp="1"/>
+          </p:cNvSpPr>
+          <p:nvPr>
+            <p:ph type="dt" idx="1"/>
+          </p:nvPr>
+        </p:nvSpPr>
+        <p:spPr>
+          <a:xfrm>
+            <a:off x="3884613" y="0"/>
+            <a:ext cx="2971800" cy="458788"/>
+          </a:xfrm>
+          <a:prstGeom prst="rect">
+            <a:avLst/>
+          </a:prstGeom>
+        </p:spPr>
+        <p:txBody>
+          <a:bodyPr vert="horz" lIns="91440" tIns="45720" rIns="91440" bIns="45720" rtlCol="0"/>
+          <a:lstStyle>
+            <a:lvl1pPr algn="r">
+              <a:defRPr sz="1200"/>
+            </a:lvl1pPr>
+          </a:lstStyle>
+          <a:p>
+            <a:fld id="{B96E6B04-2C96-4423-A246-E96C11D40EC3}" type="datetimeFigureOut">
+              <a:rPr lang="pt-BR" smtClean="0"/>
+              <a:t>01/05/2020</a:t>
+            </a:fld>
+            <a:endParaRPr lang="pt-BR"/>
+          </a:p>
+        </p:txBody>
+      </p:sp>
+      <p:sp>
+        <p:nvSpPr>
+          <p:cNvPr id="4" name="Espaço Reservado para Imagem de Slide 3">
+            <a:extLst>
+              <a:ext uri="{FF2B5EF4-FFF2-40B4-BE49-F238E27FC236}">
+                <a16:creationId xmlns:a16="http://schemas.microsoft.com/office/drawing/2014/main" id="{3FBD8057-1671-4D3E-A35B-88B73E68334C}"/>
+              </a:ext>
+            </a:extLst>
+          </p:cNvPr>
+          <p:cNvSpPr>
+            <a:spLocks noGrp="1" noRot="1" noChangeAspect="1"/>
+          </p:cNvSpPr>
+          <p:nvPr>
+            <p:ph type="sldImg" idx="2"/>
+          </p:nvPr>
+        </p:nvSpPr>
+        <p:spPr>
+          <a:xfrm>
+            <a:off x="685800" y="1143000"/>
+            <a:ext cx="5486400" cy="3086100"/>
+          </a:xfrm>
+          <a:prstGeom prst="rect">
+            <a:avLst/>
+          </a:prstGeom>
+          <a:noFill/>
+          <a:ln w="12700">
+            <a:solidFill>
+              <a:prstClr val="black"/>
+            </a:solidFill>
+          </a:ln>
+        </p:spPr>
+        <p:txBody>
+          <a:bodyPr vert="horz" lIns="91440" tIns="45720" rIns="91440" bIns="45720" rtlCol="0" anchor="ctr"/>
+          <a:lstStyle/>
+          <a:p>
+            <a:endParaRPr lang="pt-BR"/>
+          </a:p>
+        </p:txBody>
+      </p:sp>
+      <p:sp>
+        <p:nvSpPr>
+          <p:cNvPr id="5" name="Espaço Reservado para Anotações 4">
+            <a:extLst>
+              <a:ext uri="{FF2B5EF4-FFF2-40B4-BE49-F238E27FC236}">
+                <a16:creationId xmlns:a16="http://schemas.microsoft.com/office/drawing/2014/main" id="{3A5FC921-6422-40A8-BF15-392651958C29}"/>
+              </a:ext>
+            </a:extLst>
+          </p:cNvPr>
+          <p:cNvSpPr>
+            <a:spLocks noGrp="1"/>
+          </p:cNvSpPr>
+          <p:nvPr>
+            <p:ph type="body" sz="quarter" idx="3"/>
+          </p:nvPr>
+        </p:nvSpPr>
+        <p:spPr>
+          <a:xfrm>
+            <a:off x="685800" y="4400550"/>
+            <a:ext cx="5486400" cy="3600450"/>
+          </a:xfrm>
+          <a:prstGeom prst="rect">
+            <a:avLst/>
+          </a:prstGeom>
+        </p:spPr>
+        <p:txBody>
+          <a:bodyPr vert="horz" lIns="91440" tIns="45720" rIns="91440" bIns="45720" rtlCol="0"/>
+          <a:lstStyle/>
+          <a:p>
+            <a:pPr lvl="0"/>
+            <a:r>
+              <a:rPr lang="pt-BR"/>
+              <a:t>Clique para editar os estilos de texto Mestres</a:t>
+            </a:r>
+          </a:p>
+          <a:p>
+            <a:pPr lvl="1"/>
+            <a:r>
+              <a:rPr lang="pt-BR"/>
+              <a:t>Segundo nível</a:t>
+            </a:r>
+          </a:p>
+          <a:p>
+            <a:pPr lvl="2"/>
+            <a:r>
+              <a:rPr lang="pt-BR"/>
+              <a:t>Terceiro nível</a:t>
+            </a:r>
+          </a:p>
+          <a:p>
+            <a:pPr lvl="3"/>
+            <a:r>
+              <a:rPr lang="pt-BR"/>
+              <a:t>Quarto nível</a:t>
+            </a:r>
+          </a:p>
+          <a:p>
+            <a:pPr lvl="4"/>
+            <a:r>
+              <a:rPr lang="pt-BR"/>
+              <a:t>Quinto nível</a:t>
+            </a:r>
+          </a:p>
+        </p:txBody>
+      </p:sp>
+      <p:sp>
+        <p:nvSpPr>
+          <p:cNvPr id="6" name="Espaço Reservado para Rodapé 5">
+            <a:extLst>
+              <a:ext uri="{FF2B5EF4-FFF2-40B4-BE49-F238E27FC236}">
+                <a16:creationId xmlns:a16="http://schemas.microsoft.com/office/drawing/2014/main" id="{43437E70-8183-4E10-B393-EC43388DCBB2}"/>
+              </a:ext>
+            </a:extLst>
+          </p:cNvPr>
+          <p:cNvSpPr>
+            <a:spLocks noGrp="1"/>
+          </p:cNvSpPr>
+          <p:nvPr>
+            <p:ph type="ftr" sz="quarter" idx="4"/>
+          </p:nvPr>
+        </p:nvSpPr>
+        <p:spPr>
+          <a:xfrm>
+            <a:off x="0" y="8685213"/>
+            <a:ext cx="2971800" cy="458787"/>
+          </a:xfrm>
+          <a:prstGeom prst="rect">
+            <a:avLst/>
+          </a:prstGeom>
+        </p:spPr>
+        <p:txBody>
+          <a:bodyPr vert="horz" lIns="91440" tIns="45720" rIns="91440" bIns="45720" rtlCol="0" anchor="b"/>
+          <a:lstStyle>
+            <a:lvl1pPr algn="l">
+              <a:defRPr sz="1200"/>
+            </a:lvl1pPr>
+          </a:lstStyle>
+          <a:p>
+            <a:endParaRPr lang="pt-BR"/>
+          </a:p>
+        </p:txBody>
+      </p:sp>
+      <p:sp>
+        <p:nvSpPr>
+          <p:cNvPr id="7" name="Espaço Reservado para Número de Slide 6">
+            <a:extLst>
+              <a:ext uri="{FF2B5EF4-FFF2-40B4-BE49-F238E27FC236}">
+                <a16:creationId xmlns:a16="http://schemas.microsoft.com/office/drawing/2014/main" id="{44938540-B5AF-44B8-89A1-84FD144AEFA4}"/>
+              </a:ext>
+            </a:extLst>
+          </p:cNvPr>
+          <p:cNvSpPr>
+            <a:spLocks noGrp="1"/>
+          </p:cNvSpPr>
+          <p:nvPr>
+            <p:ph type="sldNum" sz="quarter" idx="5"/>
+          </p:nvPr>
+        </p:nvSpPr>
+        <p:spPr>
+          <a:xfrm>
+            <a:off x="3884613" y="8685213"/>
+            <a:ext cx="2971800" cy="458787"/>
+          </a:xfrm>
+          <a:prstGeom prst="rect">
+            <a:avLst/>
+          </a:prstGeom>
+        </p:spPr>
+        <p:txBody>
+          <a:bodyPr vert="horz" lIns="91440" tIns="45720" rIns="91440" bIns="45720" rtlCol="0" anchor="b"/>
+          <a:lstStyle>
+            <a:lvl1pPr algn="r">
+              <a:defRPr sz="1200"/>
+            </a:lvl1pPr>
+          </a:lstStyle>
+          <a:p>
+            <a:fld id="{3DD90997-D157-4C7B-A32A-2C3FC4198C61}" type="slidenum">
+              <a:rPr lang="pt-BR" smtClean="0"/>
+              <a:t>‹nº›</a:t>
+            </a:fld>
+            <a:endParaRPr lang="pt-BR"/>
+          </a:p>
+        </p:txBody>
+      </p:sp>
+    </p:spTree>
+  </p:cSld>
+  <p:clrMap bg1="lt1" tx1="dk1" bg2="lt2" tx2="dk2" accent1="accent1" accent2="accent2" accent3="accent3" accent4="accent4" accent5="accent5" accent6="accent6" hlink="hlink" folHlink="folHlink"/>
+  <p:notesStyle>
+    <a:lvl1pPr marL="0" algn="l" defTabSz="914400" rtl="0" eaLnBrk="1" latinLnBrk="0" hangingPunct="1">
+      <a:defRPr sz="1200" kern="1200">
+        <a:solidFill>
+          <a:schemeClr val="tx1"/>
+        </a:solidFill>
+        <a:latin typeface="+mn-lt"/>
+        <a:ea typeface="+mn-ea"/>
+        <a:cs typeface="+mn-cs"/>
+      </a:defRPr>
+    </a:lvl1pPr>
+    <a:lvl2pPr marL="457200" algn="l" defTabSz="914400" rtl="0" eaLnBrk="1" latinLnBrk="0" hangingPunct="1">
+      <a:defRPr sz="1200" kern="1200">
+        <a:solidFill>
+          <a:schemeClr val="tx1"/>
+        </a:solidFill>
+        <a:latin typeface="+mn-lt"/>
+        <a:ea typeface="+mn-ea"/>
+        <a:cs typeface="+mn-cs"/>
+      </a:defRPr>
+    </a:lvl2pPr>
+    <a:lvl3pPr marL="914400" algn="l" defTabSz="914400" rtl="0" eaLnBrk="1" latinLnBrk="0" hangingPunct="1">
+      <a:defRPr sz="1200" kern="1200">
+        <a:solidFill>
+          <a:schemeClr val="tx1"/>
+        </a:solidFill>
+        <a:latin typeface="+mn-lt"/>
+        <a:ea typeface="+mn-ea"/>
+        <a:cs typeface="+mn-cs"/>
+      </a:defRPr>
+    </a:lvl3pPr>
+    <a:lvl4pPr marL="1371600" algn="l" defTabSz="914400" rtl="0" eaLnBrk="1" latinLnBrk="0" hangingPunct="1">
+      <a:defRPr sz="1200" kern="1200">
+        <a:solidFill>
+          <a:schemeClr val="tx1"/>
+        </a:solidFill>
+        <a:latin typeface="+mn-lt"/>
+        <a:ea typeface="+mn-ea"/>
+        <a:cs typeface="+mn-cs"/>
+      </a:defRPr>
+    </a:lvl4pPr>
+    <a:lvl5pPr marL="1828800" algn="l" defTabSz="914400" rtl="0" eaLnBrk="1" latinLnBrk="0" hangingPunct="1">
+      <a:defRPr sz="1200" kern="1200">
+        <a:solidFill>
+          <a:schemeClr val="tx1"/>
+        </a:solidFill>
+        <a:latin typeface="+mn-lt"/>
+        <a:ea typeface="+mn-ea"/>
+        <a:cs typeface="+mn-cs"/>
+      </a:defRPr>
+    </a:lvl5pPr>
+    <a:lvl6pPr marL="2286000" algn="l" defTabSz="914400" rtl="0" eaLnBrk="1" latinLnBrk="0" hangingPunct="1">
+      <a:defRPr sz="1200" kern="1200">
+        <a:solidFill>
+          <a:schemeClr val="tx1"/>
+        </a:solidFill>
+        <a:latin typeface="+mn-lt"/>
+        <a:ea typeface="+mn-ea"/>
+        <a:cs typeface="+mn-cs"/>
+      </a:defRPr>
+    </a:lvl6pPr>
+    <a:lvl7pPr marL="2743200" algn="l" defTabSz="914400" rtl="0" eaLnBrk="1" latinLnBrk="0" hangingPunct="1">
+      <a:defRPr sz="1200" kern="1200">
+        <a:solidFill>
+          <a:schemeClr val="tx1"/>
+        </a:solidFill>
+        <a:latin typeface="+mn-lt"/>
+        <a:ea typeface="+mn-ea"/>
+        <a:cs typeface="+mn-cs"/>
+      </a:defRPr>
+    </a:lvl7pPr>
+    <a:lvl8pPr marL="3200400" algn="l" defTabSz="914400" rtl="0" eaLnBrk="1" latinLnBrk="0" hangingPunct="1">
+      <a:defRPr sz="1200" kern="1200">
+        <a:solidFill>
+          <a:schemeClr val="tx1"/>
+        </a:solidFill>
+        <a:latin typeface="+mn-lt"/>
+        <a:ea typeface="+mn-ea"/>
+        <a:cs typeface="+mn-cs"/>
+      </a:defRPr>
+    </a:lvl8pPr>
+    <a:lvl9pPr marL="3657600" algn="l" defTabSz="914400" rtl="0" eaLnBrk="1" latinLnBrk="0" hangingPunct="1">
+      <a:defRPr sz="1200" kern="1200">
+        <a:solidFill>
+          <a:schemeClr val="tx1"/>
+        </a:solidFill>
+        <a:latin typeface="+mn-lt"/>
+        <a:ea typeface="+mn-ea"/>
+        <a:cs typeface="+mn-cs"/>
+      </a:defRPr>
+    </a:lvl9pPr>
+  </p:notesStyle>
+</p:notesMaster>
+</file>
+
+<file path=ppt/notesSlides/notesSlide1.xml><?xml version="1.0" encoding="utf-8"?>
+<p:notes xmlns:a="http://schemas.openxmlformats.org/drawingml/2006/main" xmlns:r="http://schemas.openxmlformats.org/officeDocument/2006/relationships" xmlns:p="http://schemas.openxmlformats.org/presentationml/2006/main">
+  <p:cSld>
+    <p:spTree>
+      <p:nvGrpSpPr>
+        <p:cNvPr id="1" name=""/>
+        <p:cNvGrpSpPr/>
+        <p:nvPr/>
+      </p:nvGrpSpPr>
+      <p:grpSpPr>
+        <a:xfrm>
+          <a:off x="0" y="0"/>
+          <a:ext cx="0" cy="0"/>
+          <a:chOff x="0" y="0"/>
+          <a:chExt cx="0" cy="0"/>
+        </a:xfrm>
+      </p:grpSpPr>
+      <p:sp>
+        <p:nvSpPr>
+          <p:cNvPr id="2" name="Espaço Reservado para Imagem de Slide 1"/>
+          <p:cNvSpPr>
+            <a:spLocks noGrp="1" noRot="1" noChangeAspect="1"/>
+          </p:cNvSpPr>
+          <p:nvPr>
+            <p:ph type="sldImg"/>
+          </p:nvPr>
+        </p:nvSpPr>
+        <p:spPr/>
+      </p:sp>
+      <p:sp>
+        <p:nvSpPr>
+          <p:cNvPr id="3" name="Espaço Reservado para Anotações 2"/>
+          <p:cNvSpPr>
+            <a:spLocks noGrp="1"/>
+          </p:cNvSpPr>
+          <p:nvPr>
+            <p:ph type="body" idx="1"/>
+          </p:nvPr>
+        </p:nvSpPr>
+        <p:spPr/>
+        <p:txBody>
+          <a:bodyPr/>
+          <a:lstStyle/>
+          <a:p>
+            <a:r>
+              <a:rPr lang="pt-BR" dirty="0"/>
+              <a:t>Comunicação </a:t>
+            </a:r>
+            <a:r>
+              <a:rPr lang="pt-BR" dirty="0" err="1"/>
+              <a:t>java</a:t>
+            </a:r>
+            <a:r>
+              <a:rPr lang="pt-BR" dirty="0"/>
+              <a:t> com </a:t>
+            </a:r>
+            <a:r>
+              <a:rPr lang="pt-BR" dirty="0" err="1"/>
+              <a:t>heroku</a:t>
+            </a:r>
+            <a:r>
+              <a:rPr lang="pt-BR" dirty="0"/>
+              <a:t> = requisição</a:t>
+            </a:r>
+          </a:p>
+          <a:p>
+            <a:r>
+              <a:rPr lang="pt-BR" dirty="0"/>
+              <a:t>*</a:t>
+            </a:r>
+            <a:r>
+              <a:rPr lang="pt-BR" dirty="0" err="1"/>
+              <a:t>sequelize</a:t>
+            </a:r>
+            <a:r>
+              <a:rPr lang="pt-BR" dirty="0"/>
+              <a:t> – porque citar</a:t>
+            </a:r>
+          </a:p>
+        </p:txBody>
+      </p:sp>
+      <p:sp>
+        <p:nvSpPr>
+          <p:cNvPr id="4" name="Espaço Reservado para Número de Slide 3"/>
+          <p:cNvSpPr>
+            <a:spLocks noGrp="1"/>
+          </p:cNvSpPr>
+          <p:nvPr>
+            <p:ph type="sldNum" sz="quarter" idx="5"/>
+          </p:nvPr>
+        </p:nvSpPr>
+        <p:spPr/>
+        <p:txBody>
+          <a:bodyPr/>
+          <a:lstStyle/>
+          <a:p>
+            <a:fld id="{081649A3-17F6-4213-BE7C-BAD851FE8670}" type="slidenum">
+              <a:rPr lang="pt-BR" smtClean="0"/>
+              <a:t>1</a:t>
+            </a:fld>
+            <a:endParaRPr lang="pt-BR"/>
+          </a:p>
+        </p:txBody>
+      </p:sp>
+    </p:spTree>
+    <p:extLst>
+      <p:ext uri="{BB962C8B-B14F-4D97-AF65-F5344CB8AC3E}">
+        <p14:creationId xmlns:p14="http://schemas.microsoft.com/office/powerpoint/2010/main" val="2851468804"/>
+      </p:ext>
+    </p:extLst>
+  </p:cSld>
+  <p:clrMapOvr>
+    <a:masterClrMapping/>
+  </p:clrMapOvr>
+</p:notes>
+</file>
+
 <file path=ppt/slideLayouts/slideLayout1.xml><?xml version="1.0" encoding="utf-8"?>
 <p:sldLayout xmlns:a="http://schemas.openxmlformats.org/drawingml/2006/main" xmlns:r="http://schemas.openxmlformats.org/officeDocument/2006/relationships" xmlns:p="http://schemas.openxmlformats.org/presentationml/2006/main" type="title" preserve="1">
   <p:cSld name="Slide de Título">
@@ -259,7 +759,7 @@
           <a:p>
             <a:fld id="{F9E70DCC-2D0E-48AC-BADC-8D2813897323}" type="datetimeFigureOut">
               <a:rPr lang="pt-BR" smtClean="0"/>
-              <a:t>13/04/2020</a:t>
+              <a:t>01/05/2020</a:t>
             </a:fld>
             <a:endParaRPr lang="pt-BR"/>
           </a:p>
@@ -457,7 +957,7 @@
           <a:p>
             <a:fld id="{F9E70DCC-2D0E-48AC-BADC-8D2813897323}" type="datetimeFigureOut">
               <a:rPr lang="pt-BR" smtClean="0"/>
-              <a:t>13/04/2020</a:t>
+              <a:t>01/05/2020</a:t>
             </a:fld>
             <a:endParaRPr lang="pt-BR"/>
           </a:p>
@@ -665,7 +1165,7 @@
           <a:p>
             <a:fld id="{F9E70DCC-2D0E-48AC-BADC-8D2813897323}" type="datetimeFigureOut">
               <a:rPr lang="pt-BR" smtClean="0"/>
-              <a:t>13/04/2020</a:t>
+              <a:t>01/05/2020</a:t>
             </a:fld>
             <a:endParaRPr lang="pt-BR"/>
           </a:p>
@@ -863,7 +1363,7 @@
           <a:p>
             <a:fld id="{F9E70DCC-2D0E-48AC-BADC-8D2813897323}" type="datetimeFigureOut">
               <a:rPr lang="pt-BR" smtClean="0"/>
-              <a:t>13/04/2020</a:t>
+              <a:t>01/05/2020</a:t>
             </a:fld>
             <a:endParaRPr lang="pt-BR"/>
           </a:p>
@@ -1138,7 +1638,7 @@
           <a:p>
             <a:fld id="{F9E70DCC-2D0E-48AC-BADC-8D2813897323}" type="datetimeFigureOut">
               <a:rPr lang="pt-BR" smtClean="0"/>
-              <a:t>13/04/2020</a:t>
+              <a:t>01/05/2020</a:t>
             </a:fld>
             <a:endParaRPr lang="pt-BR"/>
           </a:p>
@@ -1403,7 +1903,7 @@
           <a:p>
             <a:fld id="{F9E70DCC-2D0E-48AC-BADC-8D2813897323}" type="datetimeFigureOut">
               <a:rPr lang="pt-BR" smtClean="0"/>
-              <a:t>13/04/2020</a:t>
+              <a:t>01/05/2020</a:t>
             </a:fld>
             <a:endParaRPr lang="pt-BR"/>
           </a:p>
@@ -1815,7 +2315,7 @@
           <a:p>
             <a:fld id="{F9E70DCC-2D0E-48AC-BADC-8D2813897323}" type="datetimeFigureOut">
               <a:rPr lang="pt-BR" smtClean="0"/>
-              <a:t>13/04/2020</a:t>
+              <a:t>01/05/2020</a:t>
             </a:fld>
             <a:endParaRPr lang="pt-BR"/>
           </a:p>
@@ -1956,7 +2456,7 @@
           <a:p>
             <a:fld id="{F9E70DCC-2D0E-48AC-BADC-8D2813897323}" type="datetimeFigureOut">
               <a:rPr lang="pt-BR" smtClean="0"/>
-              <a:t>13/04/2020</a:t>
+              <a:t>01/05/2020</a:t>
             </a:fld>
             <a:endParaRPr lang="pt-BR"/>
           </a:p>
@@ -2069,7 +2569,7 @@
           <a:p>
             <a:fld id="{F9E70DCC-2D0E-48AC-BADC-8D2813897323}" type="datetimeFigureOut">
               <a:rPr lang="pt-BR" smtClean="0"/>
-              <a:t>13/04/2020</a:t>
+              <a:t>01/05/2020</a:t>
             </a:fld>
             <a:endParaRPr lang="pt-BR"/>
           </a:p>
@@ -2380,7 +2880,7 @@
           <a:p>
             <a:fld id="{F9E70DCC-2D0E-48AC-BADC-8D2813897323}" type="datetimeFigureOut">
               <a:rPr lang="pt-BR" smtClean="0"/>
-              <a:t>13/04/2020</a:t>
+              <a:t>01/05/2020</a:t>
             </a:fld>
             <a:endParaRPr lang="pt-BR"/>
           </a:p>
@@ -2668,7 +3168,7 @@
           <a:p>
             <a:fld id="{F9E70DCC-2D0E-48AC-BADC-8D2813897323}" type="datetimeFigureOut">
               <a:rPr lang="pt-BR" smtClean="0"/>
-              <a:t>13/04/2020</a:t>
+              <a:t>01/05/2020</a:t>
             </a:fld>
             <a:endParaRPr lang="pt-BR"/>
           </a:p>
@@ -2909,7 +3409,7 @@
           <a:p>
             <a:fld id="{F9E70DCC-2D0E-48AC-BADC-8D2813897323}" type="datetimeFigureOut">
               <a:rPr lang="pt-BR" smtClean="0"/>
-              <a:t>13/04/2020</a:t>
+              <a:t>01/05/2020</a:t>
             </a:fld>
             <a:endParaRPr lang="pt-BR"/>
           </a:p>
@@ -3328,6 +3828,153 @@
       </p:grpSpPr>
       <p:sp>
         <p:nvSpPr>
+          <p:cNvPr id="109" name="Retângulo 108">
+            <a:extLst>
+              <a:ext uri="{FF2B5EF4-FFF2-40B4-BE49-F238E27FC236}">
+                <a16:creationId xmlns:a16="http://schemas.microsoft.com/office/drawing/2014/main" id="{1CE83450-B217-47C1-945D-DF175B1449B3}"/>
+              </a:ext>
+            </a:extLst>
+          </p:cNvPr>
+          <p:cNvSpPr/>
+          <p:nvPr/>
+        </p:nvSpPr>
+        <p:spPr>
+          <a:xfrm>
+            <a:off x="344557" y="5987267"/>
+            <a:ext cx="1472147" cy="645432"/>
+          </a:xfrm>
+          <a:prstGeom prst="rect">
+            <a:avLst/>
+          </a:prstGeom>
+          <a:solidFill>
+            <a:schemeClr val="bg1"/>
+          </a:solidFill>
+          <a:ln>
+            <a:solidFill>
+              <a:srgbClr val="002060"/>
+            </a:solidFill>
+          </a:ln>
+        </p:spPr>
+        <p:style>
+          <a:lnRef idx="2">
+            <a:schemeClr val="dk1">
+              <a:shade val="50000"/>
+            </a:schemeClr>
+          </a:lnRef>
+          <a:fillRef idx="1">
+            <a:schemeClr val="dk1"/>
+          </a:fillRef>
+          <a:effectRef idx="0">
+            <a:schemeClr val="dk1"/>
+          </a:effectRef>
+          <a:fontRef idx="minor">
+            <a:schemeClr val="lt1"/>
+          </a:fontRef>
+        </p:style>
+        <p:txBody>
+          <a:bodyPr rtlCol="0" anchor="ctr"/>
+          <a:lstStyle/>
+          <a:p>
+            <a:pPr algn="ctr"/>
+            <a:endParaRPr lang="pt-BR" sz="1400" dirty="0"/>
+          </a:p>
+        </p:txBody>
+      </p:sp>
+      <p:pic>
+        <p:nvPicPr>
+          <p:cNvPr id="19" name="Gráfico 18" descr="Nuvem">
+            <a:extLst>
+              <a:ext uri="{FF2B5EF4-FFF2-40B4-BE49-F238E27FC236}">
+                <a16:creationId xmlns:a16="http://schemas.microsoft.com/office/drawing/2014/main" id="{87D98360-2FF1-43B9-B3E6-5B18278684F5}"/>
+              </a:ext>
+            </a:extLst>
+          </p:cNvPr>
+          <p:cNvPicPr>
+            <a:picLocks noChangeAspect="1"/>
+          </p:cNvPicPr>
+          <p:nvPr/>
+        </p:nvPicPr>
+        <p:blipFill>
+          <a:blip r:embed="rId3">
+            <a:extLst>
+              <a:ext uri="{28A0092B-C50C-407E-A947-70E740481C1C}">
+                <a14:useLocalDpi xmlns:a14="http://schemas.microsoft.com/office/drawing/2010/main" val="0"/>
+              </a:ext>
+              <a:ext uri="{96DAC541-7B7A-43D3-8B79-37D633B846F1}">
+                <asvg:svgBlip xmlns:asvg="http://schemas.microsoft.com/office/drawing/2016/SVG/main" r:embed="rId4"/>
+              </a:ext>
+            </a:extLst>
+          </a:blip>
+          <a:stretch>
+            <a:fillRect/>
+          </a:stretch>
+        </p:blipFill>
+        <p:spPr>
+          <a:xfrm>
+            <a:off x="-203729" y="2557466"/>
+            <a:ext cx="3488884" cy="3270632"/>
+          </a:xfrm>
+          <a:prstGeom prst="rect">
+            <a:avLst/>
+          </a:prstGeom>
+        </p:spPr>
+      </p:pic>
+      <p:sp>
+        <p:nvSpPr>
+          <p:cNvPr id="64" name="Retângulo 63">
+            <a:extLst>
+              <a:ext uri="{FF2B5EF4-FFF2-40B4-BE49-F238E27FC236}">
+                <a16:creationId xmlns:a16="http://schemas.microsoft.com/office/drawing/2014/main" id="{9298F857-BF24-4BBC-996F-F2645E0607CB}"/>
+              </a:ext>
+            </a:extLst>
+          </p:cNvPr>
+          <p:cNvSpPr/>
+          <p:nvPr/>
+        </p:nvSpPr>
+        <p:spPr>
+          <a:xfrm>
+            <a:off x="471684" y="4067851"/>
+            <a:ext cx="1994400" cy="790508"/>
+          </a:xfrm>
+          <a:prstGeom prst="rect">
+            <a:avLst/>
+          </a:prstGeom>
+          <a:solidFill>
+            <a:schemeClr val="bg1"/>
+          </a:solidFill>
+          <a:ln>
+            <a:solidFill>
+              <a:srgbClr val="002060"/>
+            </a:solidFill>
+          </a:ln>
+        </p:spPr>
+        <p:style>
+          <a:lnRef idx="2">
+            <a:schemeClr val="dk1">
+              <a:shade val="50000"/>
+            </a:schemeClr>
+          </a:lnRef>
+          <a:fillRef idx="1">
+            <a:schemeClr val="dk1"/>
+          </a:fillRef>
+          <a:effectRef idx="0">
+            <a:schemeClr val="dk1"/>
+          </a:effectRef>
+          <a:fontRef idx="minor">
+            <a:schemeClr val="lt1"/>
+          </a:fontRef>
+        </p:style>
+        <p:txBody>
+          <a:bodyPr rtlCol="0" anchor="ctr"/>
+          <a:lstStyle/>
+          <a:p>
+            <a:pPr algn="ctr"/>
+            <a:endParaRPr lang="pt-BR" sz="1400" dirty="0"/>
+          </a:p>
+        </p:txBody>
+      </p:sp>
+      <p:sp>
+        <p:nvSpPr>
           <p:cNvPr id="103" name="Retângulo 102">
             <a:extLst>
               <a:ext uri="{FF2B5EF4-FFF2-40B4-BE49-F238E27FC236}">
@@ -3378,12 +4025,51 @@
           </a:p>
         </p:txBody>
       </p:sp>
-      <p:sp>
-        <p:nvSpPr>
-          <p:cNvPr id="72" name="Fluxograma: Processo Predefinido 71">
-            <a:extLst>
-              <a:ext uri="{FF2B5EF4-FFF2-40B4-BE49-F238E27FC236}">
-                <a16:creationId xmlns:a16="http://schemas.microsoft.com/office/drawing/2014/main" id="{58821C8A-1A00-45BE-9E72-50B251201CBB}"/>
+      <p:pic>
+        <p:nvPicPr>
+          <p:cNvPr id="13" name="Gráfico 12" descr="Nuvem">
+            <a:extLst>
+              <a:ext uri="{FF2B5EF4-FFF2-40B4-BE49-F238E27FC236}">
+                <a16:creationId xmlns:a16="http://schemas.microsoft.com/office/drawing/2014/main" id="{71EA2390-3564-43C2-97FE-45A45E59BCCD}"/>
+              </a:ext>
+            </a:extLst>
+          </p:cNvPr>
+          <p:cNvPicPr>
+            <a:picLocks noChangeAspect="1"/>
+          </p:cNvPicPr>
+          <p:nvPr/>
+        </p:nvPicPr>
+        <p:blipFill>
+          <a:blip r:embed="rId5">
+            <a:extLst>
+              <a:ext uri="{28A0092B-C50C-407E-A947-70E740481C1C}">
+                <a14:useLocalDpi xmlns:a14="http://schemas.microsoft.com/office/drawing/2010/main" val="0"/>
+              </a:ext>
+              <a:ext uri="{96DAC541-7B7A-43D3-8B79-37D633B846F1}">
+                <asvg:svgBlip xmlns:asvg="http://schemas.microsoft.com/office/drawing/2016/SVG/main" r:embed="rId6"/>
+              </a:ext>
+            </a:extLst>
+          </a:blip>
+          <a:stretch>
+            <a:fillRect/>
+          </a:stretch>
+        </p:blipFill>
+        <p:spPr>
+          <a:xfrm>
+            <a:off x="594099" y="-441074"/>
+            <a:ext cx="4766239" cy="5002543"/>
+          </a:xfrm>
+          <a:prstGeom prst="rect">
+            <a:avLst/>
+          </a:prstGeom>
+        </p:spPr>
+      </p:pic>
+      <p:sp>
+        <p:nvSpPr>
+          <p:cNvPr id="12" name="Retângulo 11">
+            <a:extLst>
+              <a:ext uri="{FF2B5EF4-FFF2-40B4-BE49-F238E27FC236}">
+                <a16:creationId xmlns:a16="http://schemas.microsoft.com/office/drawing/2014/main" id="{BE203AF8-66E5-4D6A-8616-D70B1169EAE8}"/>
               </a:ext>
             </a:extLst>
           </p:cNvPr>
@@ -3392,10 +4078,10 @@
         </p:nvSpPr>
         <p:spPr>
           <a:xfrm>
-            <a:off x="10088478" y="4269664"/>
-            <a:ext cx="1885531" cy="1862816"/>
-          </a:xfrm>
-          <a:prstGeom prst="flowChartPredefinedProcess">
+            <a:off x="1816704" y="1383535"/>
+            <a:ext cx="2051050" cy="1818584"/>
+          </a:xfrm>
+          <a:prstGeom prst="rect">
             <a:avLst/>
           </a:prstGeom>
           <a:solidFill>
@@ -3429,10 +4115,10 @@
       </p:sp>
       <p:sp>
         <p:nvSpPr>
-          <p:cNvPr id="70" name="Fluxograma: Processo Predefinido 69">
-            <a:extLst>
-              <a:ext uri="{FF2B5EF4-FFF2-40B4-BE49-F238E27FC236}">
-                <a16:creationId xmlns:a16="http://schemas.microsoft.com/office/drawing/2014/main" id="{F0F3A57B-BC15-4694-9136-334889079B4C}"/>
+          <p:cNvPr id="8" name="Retângulo: Cantos Arredondados 7">
+            <a:extLst>
+              <a:ext uri="{FF2B5EF4-FFF2-40B4-BE49-F238E27FC236}">
+                <a16:creationId xmlns:a16="http://schemas.microsoft.com/office/drawing/2014/main" id="{6D539609-0BE9-4B4F-A04A-1D2540E0D676}"/>
               </a:ext>
             </a:extLst>
           </p:cNvPr>
@@ -3441,10 +4127,295 @@
         </p:nvSpPr>
         <p:spPr>
           <a:xfrm>
-            <a:off x="7439712" y="4283313"/>
-            <a:ext cx="1885531" cy="1862816"/>
-          </a:xfrm>
-          <a:prstGeom prst="flowChartPredefinedProcess">
+            <a:off x="2132151" y="1728611"/>
+            <a:ext cx="1330609" cy="1282913"/>
+          </a:xfrm>
+          <a:prstGeom prst="roundRect">
+            <a:avLst/>
+          </a:prstGeom>
+          <a:ln w="28575">
+            <a:solidFill>
+              <a:schemeClr val="accent5">
+                <a:lumMod val="50000"/>
+              </a:schemeClr>
+            </a:solidFill>
+          </a:ln>
+        </p:spPr>
+        <p:style>
+          <a:lnRef idx="2">
+            <a:schemeClr val="accent6"/>
+          </a:lnRef>
+          <a:fillRef idx="1">
+            <a:schemeClr val="lt1"/>
+          </a:fillRef>
+          <a:effectRef idx="0">
+            <a:schemeClr val="accent6"/>
+          </a:effectRef>
+          <a:fontRef idx="minor">
+            <a:schemeClr val="dk1"/>
+          </a:fontRef>
+        </p:style>
+        <p:txBody>
+          <a:bodyPr rtlCol="0" anchor="ctr"/>
+          <a:lstStyle/>
+          <a:p>
+            <a:pPr algn="ctr"/>
+            <a:endParaRPr lang="pt-BR"/>
+          </a:p>
+        </p:txBody>
+      </p:sp>
+      <p:sp>
+        <p:nvSpPr>
+          <p:cNvPr id="4" name="CaixaDeTexto 3">
+            <a:extLst>
+              <a:ext uri="{FF2B5EF4-FFF2-40B4-BE49-F238E27FC236}">
+                <a16:creationId xmlns:a16="http://schemas.microsoft.com/office/drawing/2014/main" id="{EBC4EAD0-319E-4654-8790-E1DDC52D41E3}"/>
+              </a:ext>
+            </a:extLst>
+          </p:cNvPr>
+          <p:cNvSpPr txBox="1"/>
+          <p:nvPr/>
+        </p:nvSpPr>
+        <p:spPr>
+          <a:xfrm>
+            <a:off x="211625" y="-12229"/>
+            <a:ext cx="5475732" cy="830997"/>
+          </a:xfrm>
+          <a:prstGeom prst="rect">
+            <a:avLst/>
+          </a:prstGeom>
+          <a:noFill/>
+        </p:spPr>
+        <p:txBody>
+          <a:bodyPr wrap="square" rtlCol="0">
+            <a:spAutoFit/>
+          </a:bodyPr>
+          <a:lstStyle/>
+          <a:p>
+            <a:r>
+              <a:rPr lang="pt-BR" sz="4800" b="1" dirty="0">
+                <a:solidFill>
+                  <a:srgbClr val="002060"/>
+                </a:solidFill>
+                <a:latin typeface="+mj-lt"/>
+              </a:rPr>
+              <a:t>Desenho da Solução</a:t>
+            </a:r>
+          </a:p>
+        </p:txBody>
+      </p:sp>
+      <p:sp>
+        <p:nvSpPr>
+          <p:cNvPr id="6" name="CaixaDeTexto 5">
+            <a:extLst>
+              <a:ext uri="{FF2B5EF4-FFF2-40B4-BE49-F238E27FC236}">
+                <a16:creationId xmlns:a16="http://schemas.microsoft.com/office/drawing/2014/main" id="{A41E860B-E1D7-48E4-8764-DFB3B60AFED7}"/>
+              </a:ext>
+            </a:extLst>
+          </p:cNvPr>
+          <p:cNvSpPr txBox="1"/>
+          <p:nvPr/>
+        </p:nvSpPr>
+        <p:spPr>
+          <a:xfrm>
+            <a:off x="1923966" y="1383534"/>
+            <a:ext cx="2051050" cy="369332"/>
+          </a:xfrm>
+          <a:prstGeom prst="rect">
+            <a:avLst/>
+          </a:prstGeom>
+          <a:noFill/>
+        </p:spPr>
+        <p:txBody>
+          <a:bodyPr wrap="square" rtlCol="0">
+            <a:spAutoFit/>
+          </a:bodyPr>
+          <a:lstStyle/>
+          <a:p>
+            <a:r>
+              <a:rPr lang="pt-BR" b="1" dirty="0">
+                <a:solidFill>
+                  <a:schemeClr val="bg1"/>
+                </a:solidFill>
+              </a:rPr>
+              <a:t>Banco de Dados</a:t>
+            </a:r>
+          </a:p>
+        </p:txBody>
+      </p:sp>
+      <p:sp>
+        <p:nvSpPr>
+          <p:cNvPr id="9" name="CaixaDeTexto 8">
+            <a:extLst>
+              <a:ext uri="{FF2B5EF4-FFF2-40B4-BE49-F238E27FC236}">
+                <a16:creationId xmlns:a16="http://schemas.microsoft.com/office/drawing/2014/main" id="{D02EF132-183E-4EF7-95C1-AD5DFE27215B}"/>
+              </a:ext>
+            </a:extLst>
+          </p:cNvPr>
+          <p:cNvSpPr txBox="1"/>
+          <p:nvPr/>
+        </p:nvSpPr>
+        <p:spPr>
+          <a:xfrm>
+            <a:off x="514525" y="4544187"/>
+            <a:ext cx="1005563" cy="338554"/>
+          </a:xfrm>
+          <a:prstGeom prst="rect">
+            <a:avLst/>
+          </a:prstGeom>
+          <a:noFill/>
+        </p:spPr>
+        <p:txBody>
+          <a:bodyPr wrap="square" rtlCol="0">
+            <a:spAutoFit/>
+          </a:bodyPr>
+          <a:lstStyle/>
+          <a:p>
+            <a:r>
+              <a:rPr lang="pt-BR" sz="1600" b="1" dirty="0">
+                <a:solidFill>
+                  <a:srgbClr val="002060"/>
+                </a:solidFill>
+              </a:rPr>
+              <a:t>NodeJS</a:t>
+            </a:r>
+            <a:endParaRPr lang="pt-BR" b="1" dirty="0">
+              <a:solidFill>
+                <a:srgbClr val="002060"/>
+              </a:solidFill>
+            </a:endParaRPr>
+          </a:p>
+        </p:txBody>
+      </p:sp>
+      <p:pic>
+        <p:nvPicPr>
+          <p:cNvPr id="10" name="Gráfico 9" descr="Banco de dados">
+            <a:extLst>
+              <a:ext uri="{FF2B5EF4-FFF2-40B4-BE49-F238E27FC236}">
+                <a16:creationId xmlns:a16="http://schemas.microsoft.com/office/drawing/2014/main" id="{DBDCCFD9-D2E5-4D00-B6D0-0FF008CCE737}"/>
+              </a:ext>
+            </a:extLst>
+          </p:cNvPr>
+          <p:cNvPicPr>
+            <a:picLocks noChangeAspect="1"/>
+          </p:cNvPicPr>
+          <p:nvPr/>
+        </p:nvPicPr>
+        <p:blipFill>
+          <a:blip r:embed="rId7">
+            <a:extLst>
+              <a:ext uri="{28A0092B-C50C-407E-A947-70E740481C1C}">
+                <a14:useLocalDpi xmlns:a14="http://schemas.microsoft.com/office/drawing/2010/main" val="0"/>
+              </a:ext>
+              <a:ext uri="{96DAC541-7B7A-43D3-8B79-37D633B846F1}">
+                <asvg:svgBlip xmlns:asvg="http://schemas.microsoft.com/office/drawing/2016/SVG/main" r:embed="rId8"/>
+              </a:ext>
+            </a:extLst>
+          </a:blip>
+          <a:stretch>
+            <a:fillRect/>
+          </a:stretch>
+        </p:blipFill>
+        <p:spPr>
+          <a:xfrm>
+            <a:off x="2492016" y="1994568"/>
+            <a:ext cx="532960" cy="532960"/>
+          </a:xfrm>
+          <a:prstGeom prst="rect">
+            <a:avLst/>
+          </a:prstGeom>
+        </p:spPr>
+      </p:pic>
+      <p:sp>
+        <p:nvSpPr>
+          <p:cNvPr id="11" name="CaixaDeTexto 10">
+            <a:extLst>
+              <a:ext uri="{FF2B5EF4-FFF2-40B4-BE49-F238E27FC236}">
+                <a16:creationId xmlns:a16="http://schemas.microsoft.com/office/drawing/2014/main" id="{FE299903-1A7D-4388-A32B-B54C5F19B230}"/>
+              </a:ext>
+            </a:extLst>
+          </p:cNvPr>
+          <p:cNvSpPr txBox="1"/>
+          <p:nvPr/>
+        </p:nvSpPr>
+        <p:spPr>
+          <a:xfrm>
+            <a:off x="2189787" y="2510245"/>
+            <a:ext cx="1297507" cy="338554"/>
+          </a:xfrm>
+          <a:prstGeom prst="rect">
+            <a:avLst/>
+          </a:prstGeom>
+          <a:noFill/>
+        </p:spPr>
+        <p:txBody>
+          <a:bodyPr wrap="square" rtlCol="0">
+            <a:spAutoFit/>
+          </a:bodyPr>
+          <a:lstStyle/>
+          <a:p>
+            <a:r>
+              <a:rPr lang="pt-BR" sz="1600" b="1" dirty="0"/>
+              <a:t>SQL Server</a:t>
+            </a:r>
+            <a:endParaRPr lang="pt-BR" b="1" dirty="0"/>
+          </a:p>
+        </p:txBody>
+      </p:sp>
+      <p:pic>
+        <p:nvPicPr>
+          <p:cNvPr id="14" name="Imagem 13">
+            <a:extLst>
+              <a:ext uri="{FF2B5EF4-FFF2-40B4-BE49-F238E27FC236}">
+                <a16:creationId xmlns:a16="http://schemas.microsoft.com/office/drawing/2014/main" id="{75987A3E-18E4-4D3C-B577-1594B4B72904}"/>
+              </a:ext>
+            </a:extLst>
+          </p:cNvPr>
+          <p:cNvPicPr>
+            <a:picLocks noChangeAspect="1"/>
+          </p:cNvPicPr>
+          <p:nvPr/>
+        </p:nvPicPr>
+        <p:blipFill>
+          <a:blip r:embed="rId9">
+            <a:extLst>
+              <a:ext uri="{28A0092B-C50C-407E-A947-70E740481C1C}">
+                <a14:useLocalDpi xmlns:a14="http://schemas.microsoft.com/office/drawing/2010/main" val="0"/>
+              </a:ext>
+            </a:extLst>
+          </a:blip>
+          <a:stretch>
+            <a:fillRect/>
+          </a:stretch>
+        </p:blipFill>
+        <p:spPr>
+          <a:xfrm>
+            <a:off x="4214451" y="2732285"/>
+            <a:ext cx="493261" cy="493261"/>
+          </a:xfrm>
+          <a:prstGeom prst="rect">
+            <a:avLst/>
+          </a:prstGeom>
+        </p:spPr>
+      </p:pic>
+      <p:sp>
+        <p:nvSpPr>
+          <p:cNvPr id="16" name="Retângulo 15">
+            <a:extLst>
+              <a:ext uri="{FF2B5EF4-FFF2-40B4-BE49-F238E27FC236}">
+                <a16:creationId xmlns:a16="http://schemas.microsoft.com/office/drawing/2014/main" id="{BA30E914-F32A-4F9E-B657-1801DBC4E72E}"/>
+              </a:ext>
+            </a:extLst>
+          </p:cNvPr>
+          <p:cNvSpPr/>
+          <p:nvPr/>
+        </p:nvSpPr>
+        <p:spPr>
+          <a:xfrm>
+            <a:off x="542929" y="4175835"/>
+            <a:ext cx="1847650" cy="318738"/>
+          </a:xfrm>
+          <a:prstGeom prst="rect">
             <a:avLst/>
           </a:prstGeom>
           <a:solidFill>
@@ -3472,55 +4443,56 @@
           <a:lstStyle/>
           <a:p>
             <a:pPr algn="ctr"/>
-            <a:endParaRPr lang="pt-BR"/>
-          </a:p>
-        </p:txBody>
-      </p:sp>
-      <p:pic>
-        <p:nvPicPr>
-          <p:cNvPr id="13" name="Gráfico 12" descr="Nuvem">
-            <a:extLst>
-              <a:ext uri="{FF2B5EF4-FFF2-40B4-BE49-F238E27FC236}">
-                <a16:creationId xmlns:a16="http://schemas.microsoft.com/office/drawing/2014/main" id="{71EA2390-3564-43C2-97FE-45A45E59BCCD}"/>
-              </a:ext>
-            </a:extLst>
-          </p:cNvPr>
-          <p:cNvPicPr>
-            <a:picLocks noChangeAspect="1"/>
-          </p:cNvPicPr>
+            <a:endParaRPr lang="pt-BR" dirty="0"/>
+          </a:p>
+        </p:txBody>
+      </p:sp>
+      <p:sp>
+        <p:nvSpPr>
+          <p:cNvPr id="17" name="CaixaDeTexto 16">
+            <a:extLst>
+              <a:ext uri="{FF2B5EF4-FFF2-40B4-BE49-F238E27FC236}">
+                <a16:creationId xmlns:a16="http://schemas.microsoft.com/office/drawing/2014/main" id="{371C8EE1-6D59-41A6-B956-CB29FE65B573}"/>
+              </a:ext>
+            </a:extLst>
+          </p:cNvPr>
+          <p:cNvSpPr txBox="1"/>
           <p:nvPr/>
-        </p:nvPicPr>
-        <p:blipFill>
-          <a:blip r:embed="rId2">
-            <a:extLst>
-              <a:ext uri="{28A0092B-C50C-407E-A947-70E740481C1C}">
-                <a14:useLocalDpi xmlns:a14="http://schemas.microsoft.com/office/drawing/2010/main" val="0"/>
-              </a:ext>
-              <a:ext uri="{96DAC541-7B7A-43D3-8B79-37D633B846F1}">
-                <asvg:svgBlip xmlns:asvg="http://schemas.microsoft.com/office/drawing/2016/SVG/main" r:embed="rId3"/>
-              </a:ext>
-            </a:extLst>
-          </a:blip>
-          <a:stretch>
-            <a:fillRect/>
-          </a:stretch>
-        </p:blipFill>
-        <p:spPr>
-          <a:xfrm>
-            <a:off x="528917" y="-424068"/>
-            <a:ext cx="4801385" cy="5060694"/>
+        </p:nvSpPr>
+        <p:spPr>
+          <a:xfrm>
+            <a:off x="569431" y="4150538"/>
+            <a:ext cx="1834398" cy="369332"/>
           </a:xfrm>
           <a:prstGeom prst="rect">
             <a:avLst/>
           </a:prstGeom>
-        </p:spPr>
-      </p:pic>
-      <p:sp>
-        <p:nvSpPr>
-          <p:cNvPr id="12" name="Retângulo 11">
-            <a:extLst>
-              <a:ext uri="{FF2B5EF4-FFF2-40B4-BE49-F238E27FC236}">
-                <a16:creationId xmlns:a16="http://schemas.microsoft.com/office/drawing/2014/main" id="{BE203AF8-66E5-4D6A-8616-D70B1169EAE8}"/>
+          <a:noFill/>
+        </p:spPr>
+        <p:txBody>
+          <a:bodyPr wrap="square" rtlCol="0">
+            <a:spAutoFit/>
+          </a:bodyPr>
+          <a:lstStyle/>
+          <a:p>
+            <a:pPr algn="ctr"/>
+            <a:r>
+              <a:rPr lang="pt-BR" b="1" dirty="0">
+                <a:solidFill>
+                  <a:schemeClr val="bg1"/>
+                </a:solidFill>
+              </a:rPr>
+              <a:t>API INTERNA</a:t>
+            </a:r>
+          </a:p>
+        </p:txBody>
+      </p:sp>
+      <p:sp>
+        <p:nvSpPr>
+          <p:cNvPr id="22" name="Retângulo 21">
+            <a:extLst>
+              <a:ext uri="{FF2B5EF4-FFF2-40B4-BE49-F238E27FC236}">
+                <a16:creationId xmlns:a16="http://schemas.microsoft.com/office/drawing/2014/main" id="{80114597-5E84-4D4C-A8AB-591A454717FB}"/>
               </a:ext>
             </a:extLst>
           </p:cNvPr>
@@ -3529,8 +4501,8 @@
         </p:nvSpPr>
         <p:spPr>
           <a:xfrm>
-            <a:off x="1637865" y="1383534"/>
-            <a:ext cx="2359185" cy="1896345"/>
+            <a:off x="471684" y="6155501"/>
+            <a:ext cx="1209826" cy="252720"/>
           </a:xfrm>
           <a:prstGeom prst="rect">
             <a:avLst/>
@@ -3538,592 +4510,9 @@
           <a:solidFill>
             <a:srgbClr val="002060"/>
           </a:solidFill>
-        </p:spPr>
-        <p:style>
-          <a:lnRef idx="2">
-            <a:schemeClr val="accent1">
-              <a:shade val="50000"/>
-            </a:schemeClr>
-          </a:lnRef>
-          <a:fillRef idx="1">
-            <a:schemeClr val="accent1"/>
-          </a:fillRef>
-          <a:effectRef idx="0">
-            <a:schemeClr val="accent1"/>
-          </a:effectRef>
-          <a:fontRef idx="minor">
-            <a:schemeClr val="lt1"/>
-          </a:fontRef>
-        </p:style>
-        <p:txBody>
-          <a:bodyPr rtlCol="0" anchor="ctr"/>
-          <a:lstStyle/>
-          <a:p>
-            <a:pPr algn="ctr"/>
-            <a:endParaRPr lang="pt-BR"/>
-          </a:p>
-        </p:txBody>
-      </p:sp>
-      <p:sp>
-        <p:nvSpPr>
-          <p:cNvPr id="8" name="Retângulo: Cantos Arredondados 7">
-            <a:extLst>
-              <a:ext uri="{FF2B5EF4-FFF2-40B4-BE49-F238E27FC236}">
-                <a16:creationId xmlns:a16="http://schemas.microsoft.com/office/drawing/2014/main" id="{6D539609-0BE9-4B4F-A04A-1D2540E0D676}"/>
-              </a:ext>
-            </a:extLst>
-          </p:cNvPr>
-          <p:cNvSpPr/>
-          <p:nvPr/>
-        </p:nvSpPr>
-        <p:spPr>
-          <a:xfrm>
-            <a:off x="1874863" y="1802296"/>
-            <a:ext cx="1847650" cy="1361988"/>
-          </a:xfrm>
-          <a:prstGeom prst="roundRect">
-            <a:avLst/>
-          </a:prstGeom>
-          <a:ln w="28575">
-            <a:solidFill>
-              <a:schemeClr val="accent5">
-                <a:lumMod val="50000"/>
-              </a:schemeClr>
-            </a:solidFill>
-          </a:ln>
-        </p:spPr>
-        <p:style>
-          <a:lnRef idx="2">
-            <a:schemeClr val="accent6"/>
-          </a:lnRef>
-          <a:fillRef idx="1">
-            <a:schemeClr val="lt1"/>
-          </a:fillRef>
-          <a:effectRef idx="0">
-            <a:schemeClr val="accent6"/>
-          </a:effectRef>
-          <a:fontRef idx="minor">
-            <a:schemeClr val="dk1"/>
-          </a:fontRef>
-        </p:style>
-        <p:txBody>
-          <a:bodyPr rtlCol="0" anchor="ctr"/>
-          <a:lstStyle/>
-          <a:p>
-            <a:pPr algn="ctr"/>
-            <a:endParaRPr lang="pt-BR"/>
-          </a:p>
-        </p:txBody>
-      </p:sp>
-      <p:sp>
-        <p:nvSpPr>
-          <p:cNvPr id="4" name="CaixaDeTexto 3">
-            <a:extLst>
-              <a:ext uri="{FF2B5EF4-FFF2-40B4-BE49-F238E27FC236}">
-                <a16:creationId xmlns:a16="http://schemas.microsoft.com/office/drawing/2014/main" id="{EBC4EAD0-319E-4654-8790-E1DDC52D41E3}"/>
-              </a:ext>
-            </a:extLst>
-          </p:cNvPr>
-          <p:cNvSpPr txBox="1"/>
-          <p:nvPr/>
-        </p:nvSpPr>
-        <p:spPr>
-          <a:xfrm>
-            <a:off x="211625" y="-12229"/>
-            <a:ext cx="5475732" cy="830997"/>
-          </a:xfrm>
-          <a:prstGeom prst="rect">
-            <a:avLst/>
-          </a:prstGeom>
-          <a:noFill/>
-        </p:spPr>
-        <p:txBody>
-          <a:bodyPr wrap="square" rtlCol="0">
-            <a:spAutoFit/>
-          </a:bodyPr>
-          <a:lstStyle/>
-          <a:p>
-            <a:r>
-              <a:rPr lang="pt-BR" sz="4800" b="1" dirty="0">
-                <a:solidFill>
-                  <a:srgbClr val="002060"/>
-                </a:solidFill>
-                <a:latin typeface="+mj-lt"/>
-              </a:rPr>
-              <a:t>Desenho da Solução</a:t>
-            </a:r>
-          </a:p>
-        </p:txBody>
-      </p:sp>
-      <p:sp>
-        <p:nvSpPr>
-          <p:cNvPr id="6" name="CaixaDeTexto 5">
-            <a:extLst>
-              <a:ext uri="{FF2B5EF4-FFF2-40B4-BE49-F238E27FC236}">
-                <a16:creationId xmlns:a16="http://schemas.microsoft.com/office/drawing/2014/main" id="{A41E860B-E1D7-48E4-8764-DFB3B60AFED7}"/>
-              </a:ext>
-            </a:extLst>
-          </p:cNvPr>
-          <p:cNvSpPr txBox="1"/>
-          <p:nvPr/>
-        </p:nvSpPr>
-        <p:spPr>
-          <a:xfrm>
-            <a:off x="1923966" y="1383534"/>
-            <a:ext cx="2051050" cy="369332"/>
-          </a:xfrm>
-          <a:prstGeom prst="rect">
-            <a:avLst/>
-          </a:prstGeom>
-          <a:noFill/>
-        </p:spPr>
-        <p:txBody>
-          <a:bodyPr wrap="square" rtlCol="0">
-            <a:spAutoFit/>
-          </a:bodyPr>
-          <a:lstStyle/>
-          <a:p>
-            <a:r>
-              <a:rPr lang="pt-BR" b="1" dirty="0">
-                <a:solidFill>
-                  <a:schemeClr val="bg1"/>
-                </a:solidFill>
-              </a:rPr>
-              <a:t>Banco de Dados</a:t>
-            </a:r>
-          </a:p>
-        </p:txBody>
-      </p:sp>
-      <p:pic>
-        <p:nvPicPr>
-          <p:cNvPr id="7" name="Gráfico 6" descr="Banco de dados">
-            <a:extLst>
-              <a:ext uri="{FF2B5EF4-FFF2-40B4-BE49-F238E27FC236}">
-                <a16:creationId xmlns:a16="http://schemas.microsoft.com/office/drawing/2014/main" id="{9462E791-D4B2-4DF4-80B5-D664BDA4E3C5}"/>
-              </a:ext>
-            </a:extLst>
-          </p:cNvPr>
-          <p:cNvPicPr>
-            <a:picLocks noChangeAspect="1"/>
-          </p:cNvPicPr>
-          <p:nvPr/>
-        </p:nvPicPr>
-        <p:blipFill>
-          <a:blip r:embed="rId4">
-            <a:extLst>
-              <a:ext uri="{28A0092B-C50C-407E-A947-70E740481C1C}">
-                <a14:useLocalDpi xmlns:a14="http://schemas.microsoft.com/office/drawing/2010/main" val="0"/>
-              </a:ext>
-              <a:ext uri="{96DAC541-7B7A-43D3-8B79-37D633B846F1}">
-                <asvg:svgBlip xmlns:asvg="http://schemas.microsoft.com/office/drawing/2016/SVG/main" r:embed="rId5"/>
-              </a:ext>
-            </a:extLst>
-          </a:blip>
-          <a:stretch>
-            <a:fillRect/>
-          </a:stretch>
-        </p:blipFill>
-        <p:spPr>
-          <a:xfrm>
-            <a:off x="2073533" y="2004241"/>
-            <a:ext cx="532960" cy="532960"/>
-          </a:xfrm>
-          <a:prstGeom prst="rect">
-            <a:avLst/>
-          </a:prstGeom>
-        </p:spPr>
-      </p:pic>
-      <p:sp>
-        <p:nvSpPr>
-          <p:cNvPr id="9" name="CaixaDeTexto 8">
-            <a:extLst>
-              <a:ext uri="{FF2B5EF4-FFF2-40B4-BE49-F238E27FC236}">
-                <a16:creationId xmlns:a16="http://schemas.microsoft.com/office/drawing/2014/main" id="{D02EF132-183E-4EF7-95C1-AD5DFE27215B}"/>
-              </a:ext>
-            </a:extLst>
-          </p:cNvPr>
-          <p:cNvSpPr txBox="1"/>
-          <p:nvPr/>
-        </p:nvSpPr>
-        <p:spPr>
-          <a:xfrm>
-            <a:off x="1912499" y="2506665"/>
-            <a:ext cx="1005563" cy="338554"/>
-          </a:xfrm>
-          <a:prstGeom prst="rect">
-            <a:avLst/>
-          </a:prstGeom>
-          <a:noFill/>
-        </p:spPr>
-        <p:txBody>
-          <a:bodyPr wrap="square" rtlCol="0">
-            <a:spAutoFit/>
-          </a:bodyPr>
-          <a:lstStyle/>
-          <a:p>
-            <a:r>
-              <a:rPr lang="pt-BR" sz="1600" b="1" dirty="0" err="1"/>
-              <a:t>NodeJS</a:t>
-            </a:r>
-            <a:endParaRPr lang="pt-BR" b="1" dirty="0"/>
-          </a:p>
-        </p:txBody>
-      </p:sp>
-      <p:pic>
-        <p:nvPicPr>
-          <p:cNvPr id="10" name="Gráfico 9" descr="Banco de dados">
-            <a:extLst>
-              <a:ext uri="{FF2B5EF4-FFF2-40B4-BE49-F238E27FC236}">
-                <a16:creationId xmlns:a16="http://schemas.microsoft.com/office/drawing/2014/main" id="{DBDCCFD9-D2E5-4D00-B6D0-0FF008CCE737}"/>
-              </a:ext>
-            </a:extLst>
-          </p:cNvPr>
-          <p:cNvPicPr>
-            <a:picLocks noChangeAspect="1"/>
-          </p:cNvPicPr>
-          <p:nvPr/>
-        </p:nvPicPr>
-        <p:blipFill>
-          <a:blip r:embed="rId4">
-            <a:extLst>
-              <a:ext uri="{28A0092B-C50C-407E-A947-70E740481C1C}">
-                <a14:useLocalDpi xmlns:a14="http://schemas.microsoft.com/office/drawing/2010/main" val="0"/>
-              </a:ext>
-              <a:ext uri="{96DAC541-7B7A-43D3-8B79-37D633B846F1}">
-                <asvg:svgBlip xmlns:asvg="http://schemas.microsoft.com/office/drawing/2016/SVG/main" r:embed="rId5"/>
-              </a:ext>
-            </a:extLst>
-          </a:blip>
-          <a:stretch>
-            <a:fillRect/>
-          </a:stretch>
-        </p:blipFill>
-        <p:spPr>
-          <a:xfrm>
-            <a:off x="2761590" y="1995588"/>
-            <a:ext cx="532960" cy="532960"/>
-          </a:xfrm>
-          <a:prstGeom prst="rect">
-            <a:avLst/>
-          </a:prstGeom>
-        </p:spPr>
-      </p:pic>
-      <p:sp>
-        <p:nvSpPr>
-          <p:cNvPr id="11" name="CaixaDeTexto 10">
-            <a:extLst>
-              <a:ext uri="{FF2B5EF4-FFF2-40B4-BE49-F238E27FC236}">
-                <a16:creationId xmlns:a16="http://schemas.microsoft.com/office/drawing/2014/main" id="{FE299903-1A7D-4388-A32B-B54C5F19B230}"/>
-              </a:ext>
-            </a:extLst>
-          </p:cNvPr>
-          <p:cNvSpPr txBox="1"/>
-          <p:nvPr/>
-        </p:nvSpPr>
-        <p:spPr>
-          <a:xfrm>
-            <a:off x="2662004" y="2506665"/>
-            <a:ext cx="1297507" cy="338554"/>
-          </a:xfrm>
-          <a:prstGeom prst="rect">
-            <a:avLst/>
-          </a:prstGeom>
-          <a:noFill/>
-        </p:spPr>
-        <p:txBody>
-          <a:bodyPr wrap="square" rtlCol="0">
-            <a:spAutoFit/>
-          </a:bodyPr>
-          <a:lstStyle/>
-          <a:p>
-            <a:r>
-              <a:rPr lang="pt-BR" sz="1600" b="1" dirty="0"/>
-              <a:t>SQL Server</a:t>
-            </a:r>
-            <a:endParaRPr lang="pt-BR" b="1" dirty="0"/>
-          </a:p>
-        </p:txBody>
-      </p:sp>
-      <p:pic>
-        <p:nvPicPr>
-          <p:cNvPr id="14" name="Imagem 13">
-            <a:extLst>
-              <a:ext uri="{FF2B5EF4-FFF2-40B4-BE49-F238E27FC236}">
-                <a16:creationId xmlns:a16="http://schemas.microsoft.com/office/drawing/2014/main" id="{75987A3E-18E4-4D3C-B577-1594B4B72904}"/>
-              </a:ext>
-            </a:extLst>
-          </p:cNvPr>
-          <p:cNvPicPr>
-            <a:picLocks noChangeAspect="1"/>
-          </p:cNvPicPr>
-          <p:nvPr/>
-        </p:nvPicPr>
-        <p:blipFill>
-          <a:blip r:embed="rId6">
-            <a:extLst>
-              <a:ext uri="{28A0092B-C50C-407E-A947-70E740481C1C}">
-                <a14:useLocalDpi xmlns:a14="http://schemas.microsoft.com/office/drawing/2010/main" val="0"/>
-              </a:ext>
-            </a:extLst>
-          </a:blip>
-          <a:stretch>
-            <a:fillRect/>
-          </a:stretch>
-        </p:blipFill>
-        <p:spPr>
-          <a:xfrm>
-            <a:off x="4214451" y="2732285"/>
-            <a:ext cx="493261" cy="493261"/>
-          </a:xfrm>
-          <a:prstGeom prst="rect">
-            <a:avLst/>
-          </a:prstGeom>
-        </p:spPr>
-      </p:pic>
-      <p:sp>
-        <p:nvSpPr>
-          <p:cNvPr id="15" name="Retângulo: Cantos Arredondados 14">
-            <a:extLst>
-              <a:ext uri="{FF2B5EF4-FFF2-40B4-BE49-F238E27FC236}">
-                <a16:creationId xmlns:a16="http://schemas.microsoft.com/office/drawing/2014/main" id="{911BC73C-6DD0-4750-BEED-F4B86F20E216}"/>
-              </a:ext>
-            </a:extLst>
-          </p:cNvPr>
-          <p:cNvSpPr/>
-          <p:nvPr/>
-        </p:nvSpPr>
-        <p:spPr>
-          <a:xfrm>
-            <a:off x="211625" y="4228844"/>
-            <a:ext cx="1834398" cy="602341"/>
-          </a:xfrm>
-          <a:prstGeom prst="roundRect">
-            <a:avLst/>
-          </a:prstGeom>
-          <a:ln w="28575">
-            <a:solidFill>
-              <a:schemeClr val="accent5">
-                <a:lumMod val="50000"/>
-              </a:schemeClr>
-            </a:solidFill>
-          </a:ln>
-        </p:spPr>
-        <p:style>
-          <a:lnRef idx="2">
-            <a:schemeClr val="accent6"/>
-          </a:lnRef>
-          <a:fillRef idx="1">
-            <a:schemeClr val="lt1"/>
-          </a:fillRef>
-          <a:effectRef idx="0">
-            <a:schemeClr val="accent6"/>
-          </a:effectRef>
-          <a:fontRef idx="minor">
-            <a:schemeClr val="dk1"/>
-          </a:fontRef>
-        </p:style>
-        <p:txBody>
-          <a:bodyPr rtlCol="0" anchor="ctr"/>
-          <a:lstStyle/>
-          <a:p>
-            <a:pPr algn="ctr"/>
-            <a:endParaRPr lang="pt-BR"/>
-          </a:p>
-        </p:txBody>
-      </p:sp>
-      <p:sp>
-        <p:nvSpPr>
-          <p:cNvPr id="16" name="Retângulo 15">
-            <a:extLst>
-              <a:ext uri="{FF2B5EF4-FFF2-40B4-BE49-F238E27FC236}">
-                <a16:creationId xmlns:a16="http://schemas.microsoft.com/office/drawing/2014/main" id="{BA30E914-F32A-4F9E-B657-1801DBC4E72E}"/>
-              </a:ext>
-            </a:extLst>
-          </p:cNvPr>
-          <p:cNvSpPr/>
-          <p:nvPr/>
-        </p:nvSpPr>
-        <p:spPr>
-          <a:xfrm>
-            <a:off x="198373" y="4175835"/>
-            <a:ext cx="1847650" cy="318738"/>
-          </a:xfrm>
-          <a:prstGeom prst="rect">
-            <a:avLst/>
-          </a:prstGeom>
-          <a:solidFill>
-            <a:srgbClr val="002060"/>
-          </a:solidFill>
-        </p:spPr>
-        <p:style>
-          <a:lnRef idx="2">
-            <a:schemeClr val="accent1">
-              <a:shade val="50000"/>
-            </a:schemeClr>
-          </a:lnRef>
-          <a:fillRef idx="1">
-            <a:schemeClr val="accent1"/>
-          </a:fillRef>
-          <a:effectRef idx="0">
-            <a:schemeClr val="accent1"/>
-          </a:effectRef>
-          <a:fontRef idx="minor">
-            <a:schemeClr val="lt1"/>
-          </a:fontRef>
-        </p:style>
-        <p:txBody>
-          <a:bodyPr rtlCol="0" anchor="ctr"/>
-          <a:lstStyle/>
-          <a:p>
-            <a:pPr algn="ctr"/>
-            <a:endParaRPr lang="pt-BR" dirty="0"/>
-          </a:p>
-        </p:txBody>
-      </p:sp>
-      <p:sp>
-        <p:nvSpPr>
-          <p:cNvPr id="17" name="CaixaDeTexto 16">
-            <a:extLst>
-              <a:ext uri="{FF2B5EF4-FFF2-40B4-BE49-F238E27FC236}">
-                <a16:creationId xmlns:a16="http://schemas.microsoft.com/office/drawing/2014/main" id="{371C8EE1-6D59-41A6-B956-CB29FE65B573}"/>
-              </a:ext>
-            </a:extLst>
-          </p:cNvPr>
-          <p:cNvSpPr txBox="1"/>
-          <p:nvPr/>
-        </p:nvSpPr>
-        <p:spPr>
-          <a:xfrm>
-            <a:off x="211625" y="4150538"/>
-            <a:ext cx="1834398" cy="369332"/>
-          </a:xfrm>
-          <a:prstGeom prst="rect">
-            <a:avLst/>
-          </a:prstGeom>
-          <a:noFill/>
-        </p:spPr>
-        <p:txBody>
-          <a:bodyPr wrap="square" rtlCol="0">
-            <a:spAutoFit/>
-          </a:bodyPr>
-          <a:lstStyle/>
-          <a:p>
-            <a:pPr algn="ctr"/>
-            <a:r>
-              <a:rPr lang="pt-BR" b="1" dirty="0">
-                <a:solidFill>
-                  <a:schemeClr val="bg1"/>
-                </a:solidFill>
-              </a:rPr>
-              <a:t>API</a:t>
-            </a:r>
-          </a:p>
-        </p:txBody>
-      </p:sp>
-      <p:pic>
-        <p:nvPicPr>
-          <p:cNvPr id="19" name="Gráfico 18" descr="Nuvem">
-            <a:extLst>
-              <a:ext uri="{FF2B5EF4-FFF2-40B4-BE49-F238E27FC236}">
-                <a16:creationId xmlns:a16="http://schemas.microsoft.com/office/drawing/2014/main" id="{87D98360-2FF1-43B9-B3E6-5B18278684F5}"/>
-              </a:ext>
-            </a:extLst>
-          </p:cNvPr>
-          <p:cNvPicPr>
-            <a:picLocks noChangeAspect="1"/>
-          </p:cNvPicPr>
-          <p:nvPr/>
-        </p:nvPicPr>
-        <p:blipFill>
-          <a:blip r:embed="rId7">
-            <a:extLst>
-              <a:ext uri="{28A0092B-C50C-407E-A947-70E740481C1C}">
-                <a14:useLocalDpi xmlns:a14="http://schemas.microsoft.com/office/drawing/2010/main" val="0"/>
-              </a:ext>
-              <a:ext uri="{96DAC541-7B7A-43D3-8B79-37D633B846F1}">
-                <asvg:svgBlip xmlns:asvg="http://schemas.microsoft.com/office/drawing/2016/SVG/main" r:embed="rId8"/>
-              </a:ext>
-            </a:extLst>
-          </a:blip>
-          <a:stretch>
-            <a:fillRect/>
-          </a:stretch>
-        </p:blipFill>
-        <p:spPr>
-          <a:xfrm>
-            <a:off x="990870" y="4141188"/>
-            <a:ext cx="1788735" cy="1885340"/>
-          </a:xfrm>
-          <a:prstGeom prst="rect">
-            <a:avLst/>
-          </a:prstGeom>
-        </p:spPr>
-      </p:pic>
-      <p:pic>
-        <p:nvPicPr>
-          <p:cNvPr id="21" name="Gráfico 20" descr="Adicionar">
-            <a:extLst>
-              <a:ext uri="{FF2B5EF4-FFF2-40B4-BE49-F238E27FC236}">
-                <a16:creationId xmlns:a16="http://schemas.microsoft.com/office/drawing/2014/main" id="{48CF4558-BF96-4FB4-9FE2-69D539F7E7AF}"/>
-              </a:ext>
-            </a:extLst>
-          </p:cNvPr>
-          <p:cNvPicPr>
-            <a:picLocks noChangeAspect="1"/>
-          </p:cNvPicPr>
-          <p:nvPr/>
-        </p:nvPicPr>
-        <p:blipFill>
-          <a:blip r:embed="rId9">
-            <a:extLst>
-              <a:ext uri="{28A0092B-C50C-407E-A947-70E740481C1C}">
-                <a14:useLocalDpi xmlns:a14="http://schemas.microsoft.com/office/drawing/2010/main" val="0"/>
-              </a:ext>
-              <a:ext uri="{96DAC541-7B7A-43D3-8B79-37D633B846F1}">
-                <asvg:svgBlip xmlns:asvg="http://schemas.microsoft.com/office/drawing/2016/SVG/main" r:embed="rId10"/>
-              </a:ext>
-            </a:extLst>
-          </a:blip>
-          <a:stretch>
-            <a:fillRect/>
-          </a:stretch>
-        </p:blipFill>
-        <p:spPr>
-          <a:xfrm>
-            <a:off x="708074" y="4831185"/>
-            <a:ext cx="457200" cy="457200"/>
-          </a:xfrm>
-          <a:prstGeom prst="rect">
-            <a:avLst/>
-          </a:prstGeom>
-        </p:spPr>
-      </p:pic>
-      <p:sp>
-        <p:nvSpPr>
-          <p:cNvPr id="22" name="Retângulo 21">
-            <a:extLst>
-              <a:ext uri="{FF2B5EF4-FFF2-40B4-BE49-F238E27FC236}">
-                <a16:creationId xmlns:a16="http://schemas.microsoft.com/office/drawing/2014/main" id="{80114597-5E84-4D4C-A8AB-591A454717FB}"/>
-              </a:ext>
-            </a:extLst>
-          </p:cNvPr>
-          <p:cNvSpPr/>
-          <p:nvPr/>
-        </p:nvSpPr>
-        <p:spPr>
-          <a:xfrm>
-            <a:off x="274201" y="4527815"/>
-            <a:ext cx="1209826" cy="252720"/>
-          </a:xfrm>
-          <a:prstGeom prst="rect">
-            <a:avLst/>
-          </a:prstGeom>
-          <a:solidFill>
-            <a:srgbClr val="C00000"/>
-          </a:solidFill>
           <a:ln>
             <a:solidFill>
-              <a:srgbClr val="C00000"/>
+              <a:srgbClr val="002060"/>
             </a:solidFill>
           </a:ln>
         </p:spPr>
@@ -4149,19 +4538,57 @@
           <a:p>
             <a:pPr algn="ctr"/>
             <a:r>
-              <a:rPr lang="pt-BR" sz="1400" dirty="0" err="1"/>
+              <a:rPr lang="pt-BR" sz="1400" dirty="0"/>
               <a:t>Telegram</a:t>
             </a:r>
-            <a:endParaRPr lang="pt-BR" sz="1400" dirty="0"/>
-          </a:p>
-        </p:txBody>
-      </p:sp>
-      <p:sp>
-        <p:nvSpPr>
-          <p:cNvPr id="24" name="Retângulo 23">
-            <a:extLst>
-              <a:ext uri="{FF2B5EF4-FFF2-40B4-BE49-F238E27FC236}">
-                <a16:creationId xmlns:a16="http://schemas.microsoft.com/office/drawing/2014/main" id="{AF96A498-E377-4825-80DD-CAB8415B5322}"/>
+          </a:p>
+        </p:txBody>
+      </p:sp>
+      <p:pic>
+        <p:nvPicPr>
+          <p:cNvPr id="23" name="Gráfico 22" descr="Servidor">
+            <a:extLst>
+              <a:ext uri="{FF2B5EF4-FFF2-40B4-BE49-F238E27FC236}">
+                <a16:creationId xmlns:a16="http://schemas.microsoft.com/office/drawing/2014/main" id="{88794005-7852-4117-9310-85A8F09BD293}"/>
+              </a:ext>
+            </a:extLst>
+          </p:cNvPr>
+          <p:cNvPicPr>
+            <a:picLocks noChangeAspect="1"/>
+          </p:cNvPicPr>
+          <p:nvPr/>
+        </p:nvPicPr>
+        <p:blipFill>
+          <a:blip r:embed="rId10">
+            <a:extLst>
+              <a:ext uri="{28A0092B-C50C-407E-A947-70E740481C1C}">
+                <a14:useLocalDpi xmlns:a14="http://schemas.microsoft.com/office/drawing/2010/main" val="0"/>
+              </a:ext>
+              <a:ext uri="{96DAC541-7B7A-43D3-8B79-37D633B846F1}">
+                <asvg:svgBlip xmlns:asvg="http://schemas.microsoft.com/office/drawing/2016/SVG/main" r:embed="rId11"/>
+              </a:ext>
+            </a:extLst>
+          </a:blip>
+          <a:stretch>
+            <a:fillRect/>
+          </a:stretch>
+        </p:blipFill>
+        <p:spPr>
+          <a:xfrm>
+            <a:off x="2556185" y="4585851"/>
+            <a:ext cx="297908" cy="297908"/>
+          </a:xfrm>
+          <a:prstGeom prst="rect">
+            <a:avLst/>
+          </a:prstGeom>
+        </p:spPr>
+      </p:pic>
+      <p:sp>
+        <p:nvSpPr>
+          <p:cNvPr id="34" name="Retângulo 33">
+            <a:extLst>
+              <a:ext uri="{FF2B5EF4-FFF2-40B4-BE49-F238E27FC236}">
+                <a16:creationId xmlns:a16="http://schemas.microsoft.com/office/drawing/2014/main" id="{7A6BEA5F-718B-44DB-873D-41D711AA37EA}"/>
               </a:ext>
             </a:extLst>
           </p:cNvPr>
@@ -4170,8 +4597,8 @@
         </p:nvSpPr>
         <p:spPr>
           <a:xfrm>
-            <a:off x="1267588" y="5014219"/>
-            <a:ext cx="1068242" cy="247964"/>
+            <a:off x="4842166" y="3869197"/>
+            <a:ext cx="3796023" cy="2612294"/>
           </a:xfrm>
           <a:prstGeom prst="rect">
             <a:avLst/>
@@ -4179,9 +4606,110 @@
           <a:solidFill>
             <a:srgbClr val="002060"/>
           </a:solidFill>
+          <a:ln w="38100">
+            <a:solidFill>
+              <a:srgbClr val="002060"/>
+            </a:solidFill>
+          </a:ln>
+        </p:spPr>
+        <p:style>
+          <a:lnRef idx="2">
+            <a:schemeClr val="accent6"/>
+          </a:lnRef>
+          <a:fillRef idx="1">
+            <a:schemeClr val="lt1"/>
+          </a:fillRef>
+          <a:effectRef idx="0">
+            <a:schemeClr val="accent6"/>
+          </a:effectRef>
+          <a:fontRef idx="minor">
+            <a:schemeClr val="dk1"/>
+          </a:fontRef>
+        </p:style>
+        <p:txBody>
+          <a:bodyPr rtlCol="0" anchor="ctr"/>
+          <a:lstStyle/>
+          <a:p>
+            <a:pPr algn="ctr"/>
+            <a:endParaRPr lang="pt-BR"/>
+          </a:p>
+        </p:txBody>
+      </p:sp>
+      <p:sp>
+        <p:nvSpPr>
+          <p:cNvPr id="35" name="Retângulo 34">
+            <a:extLst>
+              <a:ext uri="{FF2B5EF4-FFF2-40B4-BE49-F238E27FC236}">
+                <a16:creationId xmlns:a16="http://schemas.microsoft.com/office/drawing/2014/main" id="{51E46734-4786-4F75-96CF-1D2464B46346}"/>
+              </a:ext>
+            </a:extLst>
+          </p:cNvPr>
+          <p:cNvSpPr/>
+          <p:nvPr/>
+        </p:nvSpPr>
+        <p:spPr>
+          <a:xfrm>
+            <a:off x="4938592" y="4307967"/>
+            <a:ext cx="3596902" cy="2067530"/>
+          </a:xfrm>
+          <a:prstGeom prst="rect">
+            <a:avLst/>
+          </a:prstGeom>
+          <a:ln w="38100">
+            <a:solidFill>
+              <a:srgbClr val="002060"/>
+            </a:solidFill>
+          </a:ln>
+        </p:spPr>
+        <p:style>
+          <a:lnRef idx="2">
+            <a:schemeClr val="accent6"/>
+          </a:lnRef>
+          <a:fillRef idx="1">
+            <a:schemeClr val="lt1"/>
+          </a:fillRef>
+          <a:effectRef idx="0">
+            <a:schemeClr val="accent6"/>
+          </a:effectRef>
+          <a:fontRef idx="minor">
+            <a:schemeClr val="dk1"/>
+          </a:fontRef>
+        </p:style>
+        <p:txBody>
+          <a:bodyPr rtlCol="0" anchor="ctr"/>
+          <a:lstStyle/>
+          <a:p>
+            <a:pPr algn="ctr"/>
+            <a:endParaRPr lang="pt-BR"/>
+          </a:p>
+        </p:txBody>
+      </p:sp>
+      <p:sp>
+        <p:nvSpPr>
+          <p:cNvPr id="36" name="Retângulo 35">
+            <a:extLst>
+              <a:ext uri="{FF2B5EF4-FFF2-40B4-BE49-F238E27FC236}">
+                <a16:creationId xmlns:a16="http://schemas.microsoft.com/office/drawing/2014/main" id="{A0F9941D-0BFE-4347-B99A-60685089FBC4}"/>
+              </a:ext>
+            </a:extLst>
+          </p:cNvPr>
+          <p:cNvSpPr/>
+          <p:nvPr/>
+        </p:nvSpPr>
+        <p:spPr>
+          <a:xfrm>
+            <a:off x="5042392" y="5698918"/>
+            <a:ext cx="1585875" cy="450719"/>
+          </a:xfrm>
+          <a:prstGeom prst="rect">
+            <a:avLst/>
+          </a:prstGeom>
+          <a:solidFill>
+            <a:srgbClr val="C00000"/>
+          </a:solidFill>
           <a:ln>
             <a:solidFill>
-              <a:srgbClr val="002060"/>
+              <a:srgbClr val="C00000"/>
             </a:solidFill>
           </a:ln>
         </p:spPr>
@@ -4207,58 +4735,25 @@
           <a:p>
             <a:pPr algn="ctr"/>
             <a:r>
-              <a:rPr lang="pt-BR" sz="1400" dirty="0" err="1"/>
-              <a:t>Heroku</a:t>
-            </a:r>
-            <a:endParaRPr lang="pt-BR" sz="1400" dirty="0"/>
-          </a:p>
-        </p:txBody>
-      </p:sp>
-      <p:pic>
-        <p:nvPicPr>
-          <p:cNvPr id="23" name="Gráfico 22" descr="Servidor">
-            <a:extLst>
-              <a:ext uri="{FF2B5EF4-FFF2-40B4-BE49-F238E27FC236}">
-                <a16:creationId xmlns:a16="http://schemas.microsoft.com/office/drawing/2014/main" id="{88794005-7852-4117-9310-85A8F09BD293}"/>
-              </a:ext>
-            </a:extLst>
-          </p:cNvPr>
-          <p:cNvPicPr>
-            <a:picLocks noChangeAspect="1"/>
-          </p:cNvPicPr>
-          <p:nvPr/>
-        </p:nvPicPr>
-        <p:blipFill>
-          <a:blip r:embed="rId11">
-            <a:extLst>
-              <a:ext uri="{28A0092B-C50C-407E-A947-70E740481C1C}">
-                <a14:useLocalDpi xmlns:a14="http://schemas.microsoft.com/office/drawing/2010/main" val="0"/>
-              </a:ext>
-              <a:ext uri="{96DAC541-7B7A-43D3-8B79-37D633B846F1}">
-                <asvg:svgBlip xmlns:asvg="http://schemas.microsoft.com/office/drawing/2016/SVG/main" r:embed="rId12"/>
-              </a:ext>
-            </a:extLst>
-          </a:blip>
-          <a:stretch>
-            <a:fillRect/>
-          </a:stretch>
-        </p:blipFill>
-        <p:spPr>
-          <a:xfrm>
-            <a:off x="2214095" y="5154605"/>
-            <a:ext cx="297908" cy="297908"/>
-          </a:xfrm>
-          <a:prstGeom prst="rect">
-            <a:avLst/>
-          </a:prstGeom>
-        </p:spPr>
-      </p:pic>
-      <p:sp>
-        <p:nvSpPr>
-          <p:cNvPr id="34" name="Retângulo 33">
-            <a:extLst>
-              <a:ext uri="{FF2B5EF4-FFF2-40B4-BE49-F238E27FC236}">
-                <a16:creationId xmlns:a16="http://schemas.microsoft.com/office/drawing/2014/main" id="{7A6BEA5F-718B-44DB-873D-41D711AA37EA}"/>
+              <a:rPr lang="pt-BR" sz="1400" b="1" dirty="0"/>
+              <a:t>Requisição</a:t>
+            </a:r>
+          </a:p>
+          <a:p>
+            <a:pPr algn="ctr"/>
+            <a:r>
+              <a:rPr lang="pt-BR" sz="1400" b="1" dirty="0"/>
+              <a:t>Send email </a:t>
+            </a:r>
+          </a:p>
+        </p:txBody>
+      </p:sp>
+      <p:sp>
+        <p:nvSpPr>
+          <p:cNvPr id="37" name="Retângulo 36">
+            <a:extLst>
+              <a:ext uri="{FF2B5EF4-FFF2-40B4-BE49-F238E27FC236}">
+                <a16:creationId xmlns:a16="http://schemas.microsoft.com/office/drawing/2014/main" id="{84541F94-C638-4CAC-86C0-12390CD2FF0E}"/>
               </a:ext>
             </a:extLst>
           </p:cNvPr>
@@ -4267,108 +4762,7 @@
         </p:nvSpPr>
         <p:spPr>
           <a:xfrm>
-            <a:off x="2994062" y="3616382"/>
-            <a:ext cx="4163329" cy="3072850"/>
-          </a:xfrm>
-          <a:prstGeom prst="rect">
-            <a:avLst/>
-          </a:prstGeom>
-          <a:solidFill>
-            <a:srgbClr val="002060"/>
-          </a:solidFill>
-          <a:ln w="38100">
-            <a:solidFill>
-              <a:srgbClr val="002060"/>
-            </a:solidFill>
-          </a:ln>
-        </p:spPr>
-        <p:style>
-          <a:lnRef idx="2">
-            <a:schemeClr val="accent6"/>
-          </a:lnRef>
-          <a:fillRef idx="1">
-            <a:schemeClr val="lt1"/>
-          </a:fillRef>
-          <a:effectRef idx="0">
-            <a:schemeClr val="accent6"/>
-          </a:effectRef>
-          <a:fontRef idx="minor">
-            <a:schemeClr val="dk1"/>
-          </a:fontRef>
-        </p:style>
-        <p:txBody>
-          <a:bodyPr rtlCol="0" anchor="ctr"/>
-          <a:lstStyle/>
-          <a:p>
-            <a:pPr algn="ctr"/>
-            <a:endParaRPr lang="pt-BR"/>
-          </a:p>
-        </p:txBody>
-      </p:sp>
-      <p:sp>
-        <p:nvSpPr>
-          <p:cNvPr id="35" name="Retângulo 34">
-            <a:extLst>
-              <a:ext uri="{FF2B5EF4-FFF2-40B4-BE49-F238E27FC236}">
-                <a16:creationId xmlns:a16="http://schemas.microsoft.com/office/drawing/2014/main" id="{51E46734-4786-4F75-96CF-1D2464B46346}"/>
-              </a:ext>
-            </a:extLst>
-          </p:cNvPr>
-          <p:cNvSpPr/>
-          <p:nvPr/>
-        </p:nvSpPr>
-        <p:spPr>
-          <a:xfrm>
-            <a:off x="3133272" y="4055152"/>
-            <a:ext cx="3894400" cy="2551598"/>
-          </a:xfrm>
-          <a:prstGeom prst="rect">
-            <a:avLst/>
-          </a:prstGeom>
-          <a:ln w="38100">
-            <a:solidFill>
-              <a:srgbClr val="002060"/>
-            </a:solidFill>
-          </a:ln>
-        </p:spPr>
-        <p:style>
-          <a:lnRef idx="2">
-            <a:schemeClr val="accent6"/>
-          </a:lnRef>
-          <a:fillRef idx="1">
-            <a:schemeClr val="lt1"/>
-          </a:fillRef>
-          <a:effectRef idx="0">
-            <a:schemeClr val="accent6"/>
-          </a:effectRef>
-          <a:fontRef idx="minor">
-            <a:schemeClr val="dk1"/>
-          </a:fontRef>
-        </p:style>
-        <p:txBody>
-          <a:bodyPr rtlCol="0" anchor="ctr"/>
-          <a:lstStyle/>
-          <a:p>
-            <a:pPr algn="ctr"/>
-            <a:endParaRPr lang="pt-BR"/>
-          </a:p>
-        </p:txBody>
-      </p:sp>
-      <p:sp>
-        <p:nvSpPr>
-          <p:cNvPr id="36" name="Retângulo 35">
-            <a:extLst>
-              <a:ext uri="{FF2B5EF4-FFF2-40B4-BE49-F238E27FC236}">
-                <a16:creationId xmlns:a16="http://schemas.microsoft.com/office/drawing/2014/main" id="{A0F9941D-0BFE-4347-B99A-60685089FBC4}"/>
-              </a:ext>
-            </a:extLst>
-          </p:cNvPr>
-          <p:cNvSpPr/>
-          <p:nvPr/>
-        </p:nvSpPr>
-        <p:spPr>
-          <a:xfrm>
-            <a:off x="3311070" y="4346590"/>
+            <a:off x="6786078" y="4462957"/>
             <a:ext cx="1585875" cy="450719"/>
           </a:xfrm>
           <a:prstGeom prst="rect">
@@ -4406,17 +4800,17 @@
             <a:pPr algn="ctr"/>
             <a:r>
               <a:rPr lang="pt-BR" sz="1400" b="1" dirty="0"/>
-              <a:t>API REST TELEGRAM</a:t>
-            </a:r>
-          </a:p>
-        </p:txBody>
-      </p:sp>
-      <p:sp>
-        <p:nvSpPr>
-          <p:cNvPr id="37" name="Retângulo 36">
-            <a:extLst>
-              <a:ext uri="{FF2B5EF4-FFF2-40B4-BE49-F238E27FC236}">
-                <a16:creationId xmlns:a16="http://schemas.microsoft.com/office/drawing/2014/main" id="{84541F94-C638-4CAC-86C0-12390CD2FF0E}"/>
+              <a:t>API OSHI</a:t>
+            </a:r>
+          </a:p>
+        </p:txBody>
+      </p:sp>
+      <p:sp>
+        <p:nvSpPr>
+          <p:cNvPr id="38" name="Retângulo 37">
+            <a:extLst>
+              <a:ext uri="{FF2B5EF4-FFF2-40B4-BE49-F238E27FC236}">
+                <a16:creationId xmlns:a16="http://schemas.microsoft.com/office/drawing/2014/main" id="{237DF2D0-CE4F-48DC-B5EC-0242EB3F6F7B}"/>
               </a:ext>
             </a:extLst>
           </p:cNvPr>
@@ -4425,7 +4819,7 @@
         </p:nvSpPr>
         <p:spPr>
           <a:xfrm>
-            <a:off x="3319092" y="4900040"/>
+            <a:off x="6819644" y="5067844"/>
             <a:ext cx="1585875" cy="450719"/>
           </a:xfrm>
           <a:prstGeom prst="rect">
@@ -4463,17 +4857,17 @@
             <a:pPr algn="ctr"/>
             <a:r>
               <a:rPr lang="pt-BR" sz="1400" b="1" dirty="0"/>
-              <a:t>API OSHI</a:t>
-            </a:r>
-          </a:p>
-        </p:txBody>
-      </p:sp>
-      <p:sp>
-        <p:nvSpPr>
-          <p:cNvPr id="38" name="Retângulo 37">
-            <a:extLst>
-              <a:ext uri="{FF2B5EF4-FFF2-40B4-BE49-F238E27FC236}">
-                <a16:creationId xmlns:a16="http://schemas.microsoft.com/office/drawing/2014/main" id="{237DF2D0-CE4F-48DC-B5EC-0242EB3F6F7B}"/>
+              <a:t>TELAS SWING</a:t>
+            </a:r>
+          </a:p>
+        </p:txBody>
+      </p:sp>
+      <p:sp>
+        <p:nvSpPr>
+          <p:cNvPr id="39" name="Retângulo 38">
+            <a:extLst>
+              <a:ext uri="{FF2B5EF4-FFF2-40B4-BE49-F238E27FC236}">
+                <a16:creationId xmlns:a16="http://schemas.microsoft.com/office/drawing/2014/main" id="{DD25BFD6-1C36-4D6A-99EB-714EAEFD46F7}"/>
               </a:ext>
             </a:extLst>
           </p:cNvPr>
@@ -4482,7 +4876,7 @@
         </p:nvSpPr>
         <p:spPr>
           <a:xfrm>
-            <a:off x="3327111" y="5453945"/>
+            <a:off x="5030779" y="5084541"/>
             <a:ext cx="1585875" cy="450719"/>
           </a:xfrm>
           <a:prstGeom prst="rect">
@@ -4520,17 +4914,17 @@
             <a:pPr algn="ctr"/>
             <a:r>
               <a:rPr lang="pt-BR" sz="1400" b="1" dirty="0"/>
-              <a:t>TELAS SWING</a:t>
-            </a:r>
-          </a:p>
-        </p:txBody>
-      </p:sp>
-      <p:sp>
-        <p:nvSpPr>
-          <p:cNvPr id="39" name="Retângulo 38">
-            <a:extLst>
-              <a:ext uri="{FF2B5EF4-FFF2-40B4-BE49-F238E27FC236}">
-                <a16:creationId xmlns:a16="http://schemas.microsoft.com/office/drawing/2014/main" id="{DD25BFD6-1C36-4D6A-99EB-714EAEFD46F7}"/>
+              <a:t>LOG TXT</a:t>
+            </a:r>
+          </a:p>
+        </p:txBody>
+      </p:sp>
+      <p:sp>
+        <p:nvSpPr>
+          <p:cNvPr id="40" name="Retângulo 39">
+            <a:extLst>
+              <a:ext uri="{FF2B5EF4-FFF2-40B4-BE49-F238E27FC236}">
+                <a16:creationId xmlns:a16="http://schemas.microsoft.com/office/drawing/2014/main" id="{BFF97A0C-6A7E-443C-AC44-DA400FF7021C}"/>
               </a:ext>
             </a:extLst>
           </p:cNvPr>
@@ -4539,8 +4933,8 @@
         </p:nvSpPr>
         <p:spPr>
           <a:xfrm>
-            <a:off x="3327110" y="5981102"/>
-            <a:ext cx="1585875" cy="450719"/>
+            <a:off x="5037437" y="4473829"/>
+            <a:ext cx="1523850" cy="450719"/>
           </a:xfrm>
           <a:prstGeom prst="rect">
             <a:avLst/>
@@ -4577,17 +4971,56 @@
             <a:pPr algn="ctr"/>
             <a:r>
               <a:rPr lang="pt-BR" sz="1400" b="1" dirty="0"/>
-              <a:t>LOG TXT</a:t>
-            </a:r>
-          </a:p>
-        </p:txBody>
-      </p:sp>
-      <p:sp>
-        <p:nvSpPr>
-          <p:cNvPr id="40" name="Retângulo 39">
-            <a:extLst>
-              <a:ext uri="{FF2B5EF4-FFF2-40B4-BE49-F238E27FC236}">
-                <a16:creationId xmlns:a16="http://schemas.microsoft.com/office/drawing/2014/main" id="{BFF97A0C-6A7E-443C-AC44-DA400FF7021C}"/>
+              <a:t>JDBC</a:t>
+            </a:r>
+          </a:p>
+        </p:txBody>
+      </p:sp>
+      <p:sp>
+        <p:nvSpPr>
+          <p:cNvPr id="42" name="CaixaDeTexto 41">
+            <a:extLst>
+              <a:ext uri="{FF2B5EF4-FFF2-40B4-BE49-F238E27FC236}">
+                <a16:creationId xmlns:a16="http://schemas.microsoft.com/office/drawing/2014/main" id="{EBB39FDE-3A32-4B3B-8093-84CD40D8EA1B}"/>
+              </a:ext>
+            </a:extLst>
+          </p:cNvPr>
+          <p:cNvSpPr txBox="1"/>
+          <p:nvPr/>
+        </p:nvSpPr>
+        <p:spPr>
+          <a:xfrm>
+            <a:off x="4858357" y="3918949"/>
+            <a:ext cx="4208548" cy="338554"/>
+          </a:xfrm>
+          <a:prstGeom prst="rect">
+            <a:avLst/>
+          </a:prstGeom>
+          <a:noFill/>
+        </p:spPr>
+        <p:txBody>
+          <a:bodyPr wrap="square" rtlCol="0">
+            <a:spAutoFit/>
+          </a:bodyPr>
+          <a:lstStyle/>
+          <a:p>
+            <a:r>
+              <a:rPr lang="pt-BR" sz="1600" b="1" dirty="0">
+                <a:solidFill>
+                  <a:schemeClr val="bg1"/>
+                </a:solidFill>
+              </a:rPr>
+              <a:t>APP MONITORAÇÃO DO SO – JAVA - JAR</a:t>
+            </a:r>
+          </a:p>
+        </p:txBody>
+      </p:sp>
+      <p:sp>
+        <p:nvSpPr>
+          <p:cNvPr id="43" name="Retângulo 42">
+            <a:extLst>
+              <a:ext uri="{FF2B5EF4-FFF2-40B4-BE49-F238E27FC236}">
+                <a16:creationId xmlns:a16="http://schemas.microsoft.com/office/drawing/2014/main" id="{9188691C-964C-44CA-B091-9EB43FE05579}"/>
               </a:ext>
             </a:extLst>
           </p:cNvPr>
@@ -4596,8 +5029,290 @@
         </p:nvSpPr>
         <p:spPr>
           <a:xfrm>
-            <a:off x="5283560" y="4353688"/>
-            <a:ext cx="1523850" cy="450719"/>
+            <a:off x="7000583" y="529389"/>
+            <a:ext cx="1951358" cy="2368159"/>
+          </a:xfrm>
+          <a:prstGeom prst="rect">
+            <a:avLst/>
+          </a:prstGeom>
+          <a:ln w="28575">
+            <a:solidFill>
+              <a:schemeClr val="accent1">
+                <a:lumMod val="75000"/>
+              </a:schemeClr>
+            </a:solidFill>
+          </a:ln>
+        </p:spPr>
+        <p:style>
+          <a:lnRef idx="2">
+            <a:schemeClr val="accent1"/>
+          </a:lnRef>
+          <a:fillRef idx="1">
+            <a:schemeClr val="lt1"/>
+          </a:fillRef>
+          <a:effectRef idx="0">
+            <a:schemeClr val="accent1"/>
+          </a:effectRef>
+          <a:fontRef idx="minor">
+            <a:schemeClr val="dk1"/>
+          </a:fontRef>
+        </p:style>
+        <p:txBody>
+          <a:bodyPr rtlCol="0" anchor="ctr"/>
+          <a:lstStyle/>
+          <a:p>
+            <a:pPr algn="ctr"/>
+            <a:endParaRPr lang="pt-BR"/>
+          </a:p>
+        </p:txBody>
+      </p:sp>
+      <p:sp>
+        <p:nvSpPr>
+          <p:cNvPr id="44" name="Retângulo 43">
+            <a:extLst>
+              <a:ext uri="{FF2B5EF4-FFF2-40B4-BE49-F238E27FC236}">
+                <a16:creationId xmlns:a16="http://schemas.microsoft.com/office/drawing/2014/main" id="{122614F3-A1EB-46E7-8EA2-411A03AE0B10}"/>
+              </a:ext>
+            </a:extLst>
+          </p:cNvPr>
+          <p:cNvSpPr/>
+          <p:nvPr/>
+        </p:nvSpPr>
+        <p:spPr>
+          <a:xfrm>
+            <a:off x="7157391" y="711871"/>
+            <a:ext cx="1951358" cy="2368159"/>
+          </a:xfrm>
+          <a:prstGeom prst="rect">
+            <a:avLst/>
+          </a:prstGeom>
+          <a:ln w="28575">
+            <a:solidFill>
+              <a:schemeClr val="accent1">
+                <a:lumMod val="75000"/>
+              </a:schemeClr>
+            </a:solidFill>
+          </a:ln>
+        </p:spPr>
+        <p:style>
+          <a:lnRef idx="2">
+            <a:schemeClr val="accent1"/>
+          </a:lnRef>
+          <a:fillRef idx="1">
+            <a:schemeClr val="lt1"/>
+          </a:fillRef>
+          <a:effectRef idx="0">
+            <a:schemeClr val="accent1"/>
+          </a:effectRef>
+          <a:fontRef idx="minor">
+            <a:schemeClr val="dk1"/>
+          </a:fontRef>
+        </p:style>
+        <p:txBody>
+          <a:bodyPr rtlCol="0" anchor="ctr"/>
+          <a:lstStyle/>
+          <a:p>
+            <a:pPr algn="ctr"/>
+            <a:endParaRPr lang="pt-BR"/>
+          </a:p>
+        </p:txBody>
+      </p:sp>
+      <p:sp>
+        <p:nvSpPr>
+          <p:cNvPr id="46" name="CaixaDeTexto 45">
+            <a:extLst>
+              <a:ext uri="{FF2B5EF4-FFF2-40B4-BE49-F238E27FC236}">
+                <a16:creationId xmlns:a16="http://schemas.microsoft.com/office/drawing/2014/main" id="{39604043-D836-4F9D-BD48-206ECA5A7BCD}"/>
+              </a:ext>
+            </a:extLst>
+          </p:cNvPr>
+          <p:cNvSpPr txBox="1"/>
+          <p:nvPr/>
+        </p:nvSpPr>
+        <p:spPr>
+          <a:xfrm>
+            <a:off x="7261080" y="889303"/>
+            <a:ext cx="2051050" cy="369332"/>
+          </a:xfrm>
+          <a:prstGeom prst="rect">
+            <a:avLst/>
+          </a:prstGeom>
+          <a:noFill/>
+        </p:spPr>
+        <p:txBody>
+          <a:bodyPr wrap="square" rtlCol="0">
+            <a:spAutoFit/>
+          </a:bodyPr>
+          <a:lstStyle/>
+          <a:p>
+            <a:r>
+              <a:rPr lang="pt-BR" b="1" dirty="0">
+                <a:solidFill>
+                  <a:srgbClr val="002060"/>
+                </a:solidFill>
+              </a:rPr>
+              <a:t>DASHBOARD</a:t>
+            </a:r>
+          </a:p>
+        </p:txBody>
+      </p:sp>
+      <p:sp>
+        <p:nvSpPr>
+          <p:cNvPr id="47" name="Retângulo 46">
+            <a:extLst>
+              <a:ext uri="{FF2B5EF4-FFF2-40B4-BE49-F238E27FC236}">
+                <a16:creationId xmlns:a16="http://schemas.microsoft.com/office/drawing/2014/main" id="{AAAEBBBA-05C7-421B-8E2A-EE835FCD5DC1}"/>
+              </a:ext>
+            </a:extLst>
+          </p:cNvPr>
+          <p:cNvSpPr/>
+          <p:nvPr/>
+        </p:nvSpPr>
+        <p:spPr>
+          <a:xfrm>
+            <a:off x="9489735" y="526153"/>
+            <a:ext cx="1951358" cy="2368159"/>
+          </a:xfrm>
+          <a:prstGeom prst="rect">
+            <a:avLst/>
+          </a:prstGeom>
+          <a:ln w="28575">
+            <a:solidFill>
+              <a:schemeClr val="accent1">
+                <a:lumMod val="75000"/>
+              </a:schemeClr>
+            </a:solidFill>
+          </a:ln>
+        </p:spPr>
+        <p:style>
+          <a:lnRef idx="2">
+            <a:schemeClr val="accent1"/>
+          </a:lnRef>
+          <a:fillRef idx="1">
+            <a:schemeClr val="lt1"/>
+          </a:fillRef>
+          <a:effectRef idx="0">
+            <a:schemeClr val="accent1"/>
+          </a:effectRef>
+          <a:fontRef idx="minor">
+            <a:schemeClr val="dk1"/>
+          </a:fontRef>
+        </p:style>
+        <p:txBody>
+          <a:bodyPr rtlCol="0" anchor="ctr"/>
+          <a:lstStyle/>
+          <a:p>
+            <a:pPr algn="ctr"/>
+            <a:endParaRPr lang="pt-BR"/>
+          </a:p>
+        </p:txBody>
+      </p:sp>
+      <p:sp>
+        <p:nvSpPr>
+          <p:cNvPr id="48" name="Retângulo 47">
+            <a:extLst>
+              <a:ext uri="{FF2B5EF4-FFF2-40B4-BE49-F238E27FC236}">
+                <a16:creationId xmlns:a16="http://schemas.microsoft.com/office/drawing/2014/main" id="{B448B195-629F-4201-80E6-A6E88D69E235}"/>
+              </a:ext>
+            </a:extLst>
+          </p:cNvPr>
+          <p:cNvSpPr/>
+          <p:nvPr/>
+        </p:nvSpPr>
+        <p:spPr>
+          <a:xfrm>
+            <a:off x="9646543" y="708635"/>
+            <a:ext cx="1951358" cy="2371395"/>
+          </a:xfrm>
+          <a:prstGeom prst="rect">
+            <a:avLst/>
+          </a:prstGeom>
+          <a:ln w="28575">
+            <a:solidFill>
+              <a:schemeClr val="accent1">
+                <a:lumMod val="75000"/>
+              </a:schemeClr>
+            </a:solidFill>
+          </a:ln>
+        </p:spPr>
+        <p:style>
+          <a:lnRef idx="2">
+            <a:schemeClr val="accent1"/>
+          </a:lnRef>
+          <a:fillRef idx="1">
+            <a:schemeClr val="lt1"/>
+          </a:fillRef>
+          <a:effectRef idx="0">
+            <a:schemeClr val="accent1"/>
+          </a:effectRef>
+          <a:fontRef idx="minor">
+            <a:schemeClr val="dk1"/>
+          </a:fontRef>
+        </p:style>
+        <p:txBody>
+          <a:bodyPr rtlCol="0" anchor="ctr"/>
+          <a:lstStyle/>
+          <a:p>
+            <a:pPr algn="ctr"/>
+            <a:endParaRPr lang="pt-BR"/>
+          </a:p>
+        </p:txBody>
+      </p:sp>
+      <p:sp>
+        <p:nvSpPr>
+          <p:cNvPr id="49" name="CaixaDeTexto 48">
+            <a:extLst>
+              <a:ext uri="{FF2B5EF4-FFF2-40B4-BE49-F238E27FC236}">
+                <a16:creationId xmlns:a16="http://schemas.microsoft.com/office/drawing/2014/main" id="{1096112A-A1C9-4D4D-B243-EA250BA1D9AE}"/>
+              </a:ext>
+            </a:extLst>
+          </p:cNvPr>
+          <p:cNvSpPr txBox="1"/>
+          <p:nvPr/>
+        </p:nvSpPr>
+        <p:spPr>
+          <a:xfrm>
+            <a:off x="9795103" y="854967"/>
+            <a:ext cx="2051050" cy="369332"/>
+          </a:xfrm>
+          <a:prstGeom prst="rect">
+            <a:avLst/>
+          </a:prstGeom>
+          <a:noFill/>
+        </p:spPr>
+        <p:txBody>
+          <a:bodyPr wrap="square" rtlCol="0">
+            <a:spAutoFit/>
+          </a:bodyPr>
+          <a:lstStyle/>
+          <a:p>
+            <a:r>
+              <a:rPr lang="pt-BR" b="1" dirty="0">
+                <a:solidFill>
+                  <a:srgbClr val="002060"/>
+                </a:solidFill>
+              </a:rPr>
+              <a:t>INSTITUCIONAL</a:t>
+            </a:r>
+          </a:p>
+        </p:txBody>
+      </p:sp>
+      <p:sp>
+        <p:nvSpPr>
+          <p:cNvPr id="51" name="Retângulo 50">
+            <a:extLst>
+              <a:ext uri="{FF2B5EF4-FFF2-40B4-BE49-F238E27FC236}">
+                <a16:creationId xmlns:a16="http://schemas.microsoft.com/office/drawing/2014/main" id="{2CCFB747-6054-4769-88B4-9153FF12BBC1}"/>
+              </a:ext>
+            </a:extLst>
+          </p:cNvPr>
+          <p:cNvSpPr/>
+          <p:nvPr/>
+        </p:nvSpPr>
+        <p:spPr>
+          <a:xfrm>
+            <a:off x="9779493" y="1256095"/>
+            <a:ext cx="1683486" cy="280075"/>
           </a:xfrm>
           <a:prstGeom prst="rect">
             <a:avLst/>
@@ -4634,17 +5349,17 @@
             <a:pPr algn="ctr"/>
             <a:r>
               <a:rPr lang="pt-BR" sz="1400" b="1" dirty="0"/>
-              <a:t>JDBC</a:t>
-            </a:r>
-          </a:p>
-        </p:txBody>
-      </p:sp>
-      <p:sp>
-        <p:nvSpPr>
-          <p:cNvPr id="41" name="Retângulo 40">
-            <a:extLst>
-              <a:ext uri="{FF2B5EF4-FFF2-40B4-BE49-F238E27FC236}">
-                <a16:creationId xmlns:a16="http://schemas.microsoft.com/office/drawing/2014/main" id="{06774B70-1188-4619-B04A-909E609E6960}"/>
+              <a:t>BOOTSTRAP</a:t>
+            </a:r>
+          </a:p>
+        </p:txBody>
+      </p:sp>
+      <p:sp>
+        <p:nvSpPr>
+          <p:cNvPr id="53" name="Retângulo 52">
+            <a:extLst>
+              <a:ext uri="{FF2B5EF4-FFF2-40B4-BE49-F238E27FC236}">
+                <a16:creationId xmlns:a16="http://schemas.microsoft.com/office/drawing/2014/main" id="{E7D0010F-CAFB-4E5A-8A0E-B1854C62478C}"/>
               </a:ext>
             </a:extLst>
           </p:cNvPr>
@@ -4653,8 +5368,8 @@
         </p:nvSpPr>
         <p:spPr>
           <a:xfrm>
-            <a:off x="5283560" y="4875701"/>
-            <a:ext cx="1540286" cy="450719"/>
+            <a:off x="9769043" y="1691677"/>
+            <a:ext cx="1683486" cy="251328"/>
           </a:xfrm>
           <a:prstGeom prst="rect">
             <a:avLst/>
@@ -4691,56 +5406,17 @@
             <a:pPr algn="ctr"/>
             <a:r>
               <a:rPr lang="pt-BR" sz="1400" b="1" dirty="0"/>
-              <a:t>UIPATH</a:t>
-            </a:r>
-          </a:p>
-        </p:txBody>
-      </p:sp>
-      <p:sp>
-        <p:nvSpPr>
-          <p:cNvPr id="42" name="CaixaDeTexto 41">
-            <a:extLst>
-              <a:ext uri="{FF2B5EF4-FFF2-40B4-BE49-F238E27FC236}">
-                <a16:creationId xmlns:a16="http://schemas.microsoft.com/office/drawing/2014/main" id="{EBB39FDE-3A32-4B3B-8093-84CD40D8EA1B}"/>
-              </a:ext>
-            </a:extLst>
-          </p:cNvPr>
-          <p:cNvSpPr txBox="1"/>
-          <p:nvPr/>
-        </p:nvSpPr>
-        <p:spPr>
-          <a:xfrm>
-            <a:off x="3052532" y="3673662"/>
-            <a:ext cx="4208548" cy="369332"/>
-          </a:xfrm>
-          <a:prstGeom prst="rect">
-            <a:avLst/>
-          </a:prstGeom>
-          <a:noFill/>
-        </p:spPr>
-        <p:txBody>
-          <a:bodyPr wrap="square" rtlCol="0">
-            <a:spAutoFit/>
-          </a:bodyPr>
-          <a:lstStyle/>
-          <a:p>
-            <a:r>
-              <a:rPr lang="pt-BR" b="1" dirty="0">
-                <a:solidFill>
-                  <a:schemeClr val="bg1"/>
-                </a:solidFill>
-              </a:rPr>
-              <a:t>APP MONITORAÇÃO DO SO – JAVA - JAR</a:t>
-            </a:r>
-          </a:p>
-        </p:txBody>
-      </p:sp>
-      <p:sp>
-        <p:nvSpPr>
-          <p:cNvPr id="43" name="Retângulo 42">
-            <a:extLst>
-              <a:ext uri="{FF2B5EF4-FFF2-40B4-BE49-F238E27FC236}">
-                <a16:creationId xmlns:a16="http://schemas.microsoft.com/office/drawing/2014/main" id="{9188691C-964C-44CA-B091-9EB43FE05579}"/>
+              <a:t>HTML</a:t>
+            </a:r>
+          </a:p>
+        </p:txBody>
+      </p:sp>
+      <p:sp>
+        <p:nvSpPr>
+          <p:cNvPr id="54" name="Retângulo 53">
+            <a:extLst>
+              <a:ext uri="{FF2B5EF4-FFF2-40B4-BE49-F238E27FC236}">
+                <a16:creationId xmlns:a16="http://schemas.microsoft.com/office/drawing/2014/main" id="{231F2D4B-9782-4CD0-9BB1-14C0225552B9}"/>
               </a:ext>
             </a:extLst>
           </p:cNvPr>
@@ -4749,290 +5425,8 @@
         </p:nvSpPr>
         <p:spPr>
           <a:xfrm>
-            <a:off x="7000583" y="529389"/>
-            <a:ext cx="1951358" cy="2368159"/>
-          </a:xfrm>
-          <a:prstGeom prst="rect">
-            <a:avLst/>
-          </a:prstGeom>
-          <a:ln w="28575">
-            <a:solidFill>
-              <a:schemeClr val="accent1">
-                <a:lumMod val="75000"/>
-              </a:schemeClr>
-            </a:solidFill>
-          </a:ln>
-        </p:spPr>
-        <p:style>
-          <a:lnRef idx="2">
-            <a:schemeClr val="accent1"/>
-          </a:lnRef>
-          <a:fillRef idx="1">
-            <a:schemeClr val="lt1"/>
-          </a:fillRef>
-          <a:effectRef idx="0">
-            <a:schemeClr val="accent1"/>
-          </a:effectRef>
-          <a:fontRef idx="minor">
-            <a:schemeClr val="dk1"/>
-          </a:fontRef>
-        </p:style>
-        <p:txBody>
-          <a:bodyPr rtlCol="0" anchor="ctr"/>
-          <a:lstStyle/>
-          <a:p>
-            <a:pPr algn="ctr"/>
-            <a:endParaRPr lang="pt-BR"/>
-          </a:p>
-        </p:txBody>
-      </p:sp>
-      <p:sp>
-        <p:nvSpPr>
-          <p:cNvPr id="44" name="Retângulo 43">
-            <a:extLst>
-              <a:ext uri="{FF2B5EF4-FFF2-40B4-BE49-F238E27FC236}">
-                <a16:creationId xmlns:a16="http://schemas.microsoft.com/office/drawing/2014/main" id="{122614F3-A1EB-46E7-8EA2-411A03AE0B10}"/>
-              </a:ext>
-            </a:extLst>
-          </p:cNvPr>
-          <p:cNvSpPr/>
-          <p:nvPr/>
-        </p:nvSpPr>
-        <p:spPr>
-          <a:xfrm>
-            <a:off x="7157391" y="711871"/>
-            <a:ext cx="1951358" cy="2368159"/>
-          </a:xfrm>
-          <a:prstGeom prst="rect">
-            <a:avLst/>
-          </a:prstGeom>
-          <a:ln w="28575">
-            <a:solidFill>
-              <a:schemeClr val="accent1">
-                <a:lumMod val="75000"/>
-              </a:schemeClr>
-            </a:solidFill>
-          </a:ln>
-        </p:spPr>
-        <p:style>
-          <a:lnRef idx="2">
-            <a:schemeClr val="accent1"/>
-          </a:lnRef>
-          <a:fillRef idx="1">
-            <a:schemeClr val="lt1"/>
-          </a:fillRef>
-          <a:effectRef idx="0">
-            <a:schemeClr val="accent1"/>
-          </a:effectRef>
-          <a:fontRef idx="minor">
-            <a:schemeClr val="dk1"/>
-          </a:fontRef>
-        </p:style>
-        <p:txBody>
-          <a:bodyPr rtlCol="0" anchor="ctr"/>
-          <a:lstStyle/>
-          <a:p>
-            <a:pPr algn="ctr"/>
-            <a:endParaRPr lang="pt-BR"/>
-          </a:p>
-        </p:txBody>
-      </p:sp>
-      <p:sp>
-        <p:nvSpPr>
-          <p:cNvPr id="46" name="CaixaDeTexto 45">
-            <a:extLst>
-              <a:ext uri="{FF2B5EF4-FFF2-40B4-BE49-F238E27FC236}">
-                <a16:creationId xmlns:a16="http://schemas.microsoft.com/office/drawing/2014/main" id="{39604043-D836-4F9D-BD48-206ECA5A7BCD}"/>
-              </a:ext>
-            </a:extLst>
-          </p:cNvPr>
-          <p:cNvSpPr txBox="1"/>
-          <p:nvPr/>
-        </p:nvSpPr>
-        <p:spPr>
-          <a:xfrm>
-            <a:off x="7261080" y="889303"/>
-            <a:ext cx="2051050" cy="369332"/>
-          </a:xfrm>
-          <a:prstGeom prst="rect">
-            <a:avLst/>
-          </a:prstGeom>
-          <a:noFill/>
-        </p:spPr>
-        <p:txBody>
-          <a:bodyPr wrap="square" rtlCol="0">
-            <a:spAutoFit/>
-          </a:bodyPr>
-          <a:lstStyle/>
-          <a:p>
-            <a:r>
-              <a:rPr lang="pt-BR" b="1" dirty="0">
-                <a:solidFill>
-                  <a:srgbClr val="002060"/>
-                </a:solidFill>
-              </a:rPr>
-              <a:t>INSTITUCIONAL</a:t>
-            </a:r>
-          </a:p>
-        </p:txBody>
-      </p:sp>
-      <p:sp>
-        <p:nvSpPr>
-          <p:cNvPr id="47" name="Retângulo 46">
-            <a:extLst>
-              <a:ext uri="{FF2B5EF4-FFF2-40B4-BE49-F238E27FC236}">
-                <a16:creationId xmlns:a16="http://schemas.microsoft.com/office/drawing/2014/main" id="{AAAEBBBA-05C7-421B-8E2A-EE835FCD5DC1}"/>
-              </a:ext>
-            </a:extLst>
-          </p:cNvPr>
-          <p:cNvSpPr/>
-          <p:nvPr/>
-        </p:nvSpPr>
-        <p:spPr>
-          <a:xfrm>
-            <a:off x="9489735" y="526153"/>
-            <a:ext cx="1951358" cy="2368159"/>
-          </a:xfrm>
-          <a:prstGeom prst="rect">
-            <a:avLst/>
-          </a:prstGeom>
-          <a:ln w="28575">
-            <a:solidFill>
-              <a:schemeClr val="accent1">
-                <a:lumMod val="75000"/>
-              </a:schemeClr>
-            </a:solidFill>
-          </a:ln>
-        </p:spPr>
-        <p:style>
-          <a:lnRef idx="2">
-            <a:schemeClr val="accent1"/>
-          </a:lnRef>
-          <a:fillRef idx="1">
-            <a:schemeClr val="lt1"/>
-          </a:fillRef>
-          <a:effectRef idx="0">
-            <a:schemeClr val="accent1"/>
-          </a:effectRef>
-          <a:fontRef idx="minor">
-            <a:schemeClr val="dk1"/>
-          </a:fontRef>
-        </p:style>
-        <p:txBody>
-          <a:bodyPr rtlCol="0" anchor="ctr"/>
-          <a:lstStyle/>
-          <a:p>
-            <a:pPr algn="ctr"/>
-            <a:endParaRPr lang="pt-BR"/>
-          </a:p>
-        </p:txBody>
-      </p:sp>
-      <p:sp>
-        <p:nvSpPr>
-          <p:cNvPr id="48" name="Retângulo 47">
-            <a:extLst>
-              <a:ext uri="{FF2B5EF4-FFF2-40B4-BE49-F238E27FC236}">
-                <a16:creationId xmlns:a16="http://schemas.microsoft.com/office/drawing/2014/main" id="{B448B195-629F-4201-80E6-A6E88D69E235}"/>
-              </a:ext>
-            </a:extLst>
-          </p:cNvPr>
-          <p:cNvSpPr/>
-          <p:nvPr/>
-        </p:nvSpPr>
-        <p:spPr>
-          <a:xfrm>
-            <a:off x="9646543" y="708635"/>
-            <a:ext cx="1951358" cy="2371395"/>
-          </a:xfrm>
-          <a:prstGeom prst="rect">
-            <a:avLst/>
-          </a:prstGeom>
-          <a:ln w="28575">
-            <a:solidFill>
-              <a:schemeClr val="accent1">
-                <a:lumMod val="75000"/>
-              </a:schemeClr>
-            </a:solidFill>
-          </a:ln>
-        </p:spPr>
-        <p:style>
-          <a:lnRef idx="2">
-            <a:schemeClr val="accent1"/>
-          </a:lnRef>
-          <a:fillRef idx="1">
-            <a:schemeClr val="lt1"/>
-          </a:fillRef>
-          <a:effectRef idx="0">
-            <a:schemeClr val="accent1"/>
-          </a:effectRef>
-          <a:fontRef idx="minor">
-            <a:schemeClr val="dk1"/>
-          </a:fontRef>
-        </p:style>
-        <p:txBody>
-          <a:bodyPr rtlCol="0" anchor="ctr"/>
-          <a:lstStyle/>
-          <a:p>
-            <a:pPr algn="ctr"/>
-            <a:endParaRPr lang="pt-BR"/>
-          </a:p>
-        </p:txBody>
-      </p:sp>
-      <p:sp>
-        <p:nvSpPr>
-          <p:cNvPr id="49" name="CaixaDeTexto 48">
-            <a:extLst>
-              <a:ext uri="{FF2B5EF4-FFF2-40B4-BE49-F238E27FC236}">
-                <a16:creationId xmlns:a16="http://schemas.microsoft.com/office/drawing/2014/main" id="{1096112A-A1C9-4D4D-B243-EA250BA1D9AE}"/>
-              </a:ext>
-            </a:extLst>
-          </p:cNvPr>
-          <p:cNvSpPr txBox="1"/>
-          <p:nvPr/>
-        </p:nvSpPr>
-        <p:spPr>
-          <a:xfrm>
-            <a:off x="9927837" y="854967"/>
-            <a:ext cx="2051050" cy="369332"/>
-          </a:xfrm>
-          <a:prstGeom prst="rect">
-            <a:avLst/>
-          </a:prstGeom>
-          <a:noFill/>
-        </p:spPr>
-        <p:txBody>
-          <a:bodyPr wrap="square" rtlCol="0">
-            <a:spAutoFit/>
-          </a:bodyPr>
-          <a:lstStyle/>
-          <a:p>
-            <a:r>
-              <a:rPr lang="pt-BR" b="1" dirty="0">
-                <a:solidFill>
-                  <a:srgbClr val="002060"/>
-                </a:solidFill>
-              </a:rPr>
-              <a:t>DASHBOARD</a:t>
-            </a:r>
-          </a:p>
-        </p:txBody>
-      </p:sp>
-      <p:sp>
-        <p:nvSpPr>
-          <p:cNvPr id="51" name="Retângulo 50">
-            <a:extLst>
-              <a:ext uri="{FF2B5EF4-FFF2-40B4-BE49-F238E27FC236}">
-                <a16:creationId xmlns:a16="http://schemas.microsoft.com/office/drawing/2014/main" id="{2CCFB747-6054-4769-88B4-9153FF12BBC1}"/>
-              </a:ext>
-            </a:extLst>
-          </p:cNvPr>
-          <p:cNvSpPr/>
-          <p:nvPr/>
-        </p:nvSpPr>
-        <p:spPr>
-          <a:xfrm>
-            <a:off x="7268455" y="1257160"/>
-            <a:ext cx="1683486" cy="178907"/>
+            <a:off x="7262824" y="1603207"/>
+            <a:ext cx="1683486" cy="243757"/>
           </a:xfrm>
           <a:prstGeom prst="rect">
             <a:avLst/>
@@ -5068,19 +5462,18 @@
           <a:p>
             <a:pPr algn="ctr"/>
             <a:r>
-              <a:rPr lang="pt-BR" sz="1400" b="1" dirty="0" err="1"/>
-              <a:t>Bootstrap</a:t>
-            </a:r>
-            <a:endParaRPr lang="pt-BR" sz="1400" b="1" dirty="0"/>
-          </a:p>
-        </p:txBody>
-      </p:sp>
-      <p:sp>
-        <p:nvSpPr>
-          <p:cNvPr id="52" name="Retângulo 51">
-            <a:extLst>
-              <a:ext uri="{FF2B5EF4-FFF2-40B4-BE49-F238E27FC236}">
-                <a16:creationId xmlns:a16="http://schemas.microsoft.com/office/drawing/2014/main" id="{16D88533-7793-49F7-9E12-B38BA0E448F8}"/>
+              <a:rPr lang="pt-BR" sz="1400" b="1" dirty="0"/>
+              <a:t>CSS</a:t>
+            </a:r>
+          </a:p>
+        </p:txBody>
+      </p:sp>
+      <p:sp>
+        <p:nvSpPr>
+          <p:cNvPr id="55" name="Retângulo 54">
+            <a:extLst>
+              <a:ext uri="{FF2B5EF4-FFF2-40B4-BE49-F238E27FC236}">
+                <a16:creationId xmlns:a16="http://schemas.microsoft.com/office/drawing/2014/main" id="{19473D9D-772D-4C71-9DB5-59F1321C4E3B}"/>
               </a:ext>
             </a:extLst>
           </p:cNvPr>
@@ -5089,8 +5482,8 @@
         </p:nvSpPr>
         <p:spPr>
           <a:xfrm>
-            <a:off x="7268455" y="1529095"/>
-            <a:ext cx="1683486" cy="178907"/>
+            <a:off x="7236508" y="1937210"/>
+            <a:ext cx="1683486" cy="243757"/>
           </a:xfrm>
           <a:prstGeom prst="rect">
             <a:avLst/>
@@ -5127,17 +5520,89 @@
             <a:pPr algn="ctr"/>
             <a:r>
               <a:rPr lang="pt-BR" sz="1400" b="1" dirty="0"/>
-              <a:t>Node JS</a:t>
-            </a:r>
-          </a:p>
-        </p:txBody>
-      </p:sp>
-      <p:sp>
-        <p:nvSpPr>
-          <p:cNvPr id="53" name="Retângulo 52">
-            <a:extLst>
-              <a:ext uri="{FF2B5EF4-FFF2-40B4-BE49-F238E27FC236}">
-                <a16:creationId xmlns:a16="http://schemas.microsoft.com/office/drawing/2014/main" id="{E7D0010F-CAFB-4E5A-8A0E-B1854C62478C}"/>
+              <a:t>JAVA SCRIPT</a:t>
+            </a:r>
+          </a:p>
+        </p:txBody>
+      </p:sp>
+      <p:pic>
+        <p:nvPicPr>
+          <p:cNvPr id="56" name="Imagem 55">
+            <a:extLst>
+              <a:ext uri="{FF2B5EF4-FFF2-40B4-BE49-F238E27FC236}">
+                <a16:creationId xmlns:a16="http://schemas.microsoft.com/office/drawing/2014/main" id="{7E540955-B1B6-4F74-A796-D1AA6AF59430}"/>
+              </a:ext>
+            </a:extLst>
+          </p:cNvPr>
+          <p:cNvPicPr>
+            <a:picLocks noChangeAspect="1"/>
+          </p:cNvPicPr>
+          <p:nvPr/>
+        </p:nvPicPr>
+        <p:blipFill>
+          <a:blip r:embed="rId9">
+            <a:extLst>
+              <a:ext uri="{28A0092B-C50C-407E-A947-70E740481C1C}">
+                <a14:useLocalDpi xmlns:a14="http://schemas.microsoft.com/office/drawing/2010/main" val="0"/>
+              </a:ext>
+            </a:extLst>
+          </a:blip>
+          <a:stretch>
+            <a:fillRect/>
+          </a:stretch>
+        </p:blipFill>
+        <p:spPr>
+          <a:xfrm>
+            <a:off x="7280147" y="2703125"/>
+            <a:ext cx="308399" cy="308399"/>
+          </a:xfrm>
+          <a:prstGeom prst="rect">
+            <a:avLst/>
+          </a:prstGeom>
+        </p:spPr>
+      </p:pic>
+      <p:pic>
+        <p:nvPicPr>
+          <p:cNvPr id="57" name="Imagem 56">
+            <a:extLst>
+              <a:ext uri="{FF2B5EF4-FFF2-40B4-BE49-F238E27FC236}">
+                <a16:creationId xmlns:a16="http://schemas.microsoft.com/office/drawing/2014/main" id="{B4D809C6-1AA6-4566-9378-1BA6930CC924}"/>
+              </a:ext>
+            </a:extLst>
+          </p:cNvPr>
+          <p:cNvPicPr>
+            <a:picLocks noChangeAspect="1"/>
+          </p:cNvPicPr>
+          <p:nvPr/>
+        </p:nvPicPr>
+        <p:blipFill>
+          <a:blip r:embed="rId9">
+            <a:extLst>
+              <a:ext uri="{28A0092B-C50C-407E-A947-70E740481C1C}">
+                <a14:useLocalDpi xmlns:a14="http://schemas.microsoft.com/office/drawing/2010/main" val="0"/>
+              </a:ext>
+            </a:extLst>
+          </a:blip>
+          <a:stretch>
+            <a:fillRect/>
+          </a:stretch>
+        </p:blipFill>
+        <p:spPr>
+          <a:xfrm>
+            <a:off x="9715795" y="2703125"/>
+            <a:ext cx="308399" cy="308399"/>
+          </a:xfrm>
+          <a:prstGeom prst="rect">
+            <a:avLst/>
+          </a:prstGeom>
+        </p:spPr>
+      </p:pic>
+      <p:sp>
+        <p:nvSpPr>
+          <p:cNvPr id="58" name="Retângulo 57">
+            <a:extLst>
+              <a:ext uri="{FF2B5EF4-FFF2-40B4-BE49-F238E27FC236}">
+                <a16:creationId xmlns:a16="http://schemas.microsoft.com/office/drawing/2014/main" id="{25252638-9D65-4178-9ABF-042D6C808208}"/>
               </a:ext>
             </a:extLst>
           </p:cNvPr>
@@ -5146,8 +5611,8 @@
         </p:nvSpPr>
         <p:spPr>
           <a:xfrm>
-            <a:off x="7261080" y="1807498"/>
-            <a:ext cx="1683486" cy="178907"/>
+            <a:off x="7262824" y="1226134"/>
+            <a:ext cx="1683486" cy="274120"/>
           </a:xfrm>
           <a:prstGeom prst="rect">
             <a:avLst/>
@@ -5184,17 +5649,22 @@
             <a:pPr algn="ctr"/>
             <a:r>
               <a:rPr lang="pt-BR" sz="1400" b="1" dirty="0"/>
-              <a:t>HTML</a:t>
-            </a:r>
-          </a:p>
-        </p:txBody>
-      </p:sp>
-      <p:sp>
-        <p:nvSpPr>
-          <p:cNvPr id="54" name="Retângulo 53">
-            <a:extLst>
-              <a:ext uri="{FF2B5EF4-FFF2-40B4-BE49-F238E27FC236}">
-                <a16:creationId xmlns:a16="http://schemas.microsoft.com/office/drawing/2014/main" id="{231F2D4B-9782-4CD0-9BB1-14C0225552B9}"/>
+              <a:t>Google </a:t>
+            </a:r>
+            <a:r>
+              <a:rPr lang="pt-BR" sz="1400" b="1" dirty="0" err="1"/>
+              <a:t>Charts</a:t>
+            </a:r>
+            <a:endParaRPr lang="pt-BR" sz="1400" b="1" dirty="0"/>
+          </a:p>
+        </p:txBody>
+      </p:sp>
+      <p:sp>
+        <p:nvSpPr>
+          <p:cNvPr id="60" name="Retângulo 59">
+            <a:extLst>
+              <a:ext uri="{FF2B5EF4-FFF2-40B4-BE49-F238E27FC236}">
+                <a16:creationId xmlns:a16="http://schemas.microsoft.com/office/drawing/2014/main" id="{ABEC5C7F-CD6D-4E68-925D-0AB98EE242AD}"/>
               </a:ext>
             </a:extLst>
           </p:cNvPr>
@@ -5203,8 +5673,8 @@
         </p:nvSpPr>
         <p:spPr>
           <a:xfrm>
-            <a:off x="7268455" y="2085901"/>
-            <a:ext cx="1683486" cy="178907"/>
+            <a:off x="7241481" y="2272179"/>
+            <a:ext cx="1683486" cy="244256"/>
           </a:xfrm>
           <a:prstGeom prst="rect">
             <a:avLst/>
@@ -5241,17 +5711,134 @@
             <a:pPr algn="ctr"/>
             <a:r>
               <a:rPr lang="pt-BR" sz="1400" b="1" dirty="0"/>
-              <a:t>CSS</a:t>
-            </a:r>
-          </a:p>
-        </p:txBody>
-      </p:sp>
-      <p:sp>
-        <p:nvSpPr>
-          <p:cNvPr id="55" name="Retângulo 54">
-            <a:extLst>
-              <a:ext uri="{FF2B5EF4-FFF2-40B4-BE49-F238E27FC236}">
-                <a16:creationId xmlns:a16="http://schemas.microsoft.com/office/drawing/2014/main" id="{19473D9D-772D-4C71-9DB5-59F1321C4E3B}"/>
+              <a:t>SEQUELIZE</a:t>
+            </a:r>
+          </a:p>
+        </p:txBody>
+      </p:sp>
+      <p:pic>
+        <p:nvPicPr>
+          <p:cNvPr id="63" name="Gráfico 62" descr="Gráfico de pizza">
+            <a:extLst>
+              <a:ext uri="{FF2B5EF4-FFF2-40B4-BE49-F238E27FC236}">
+                <a16:creationId xmlns:a16="http://schemas.microsoft.com/office/drawing/2014/main" id="{46307574-571F-42FA-99E2-BAD01F954F36}"/>
+              </a:ext>
+            </a:extLst>
+          </p:cNvPr>
+          <p:cNvPicPr>
+            <a:picLocks noChangeAspect="1"/>
+          </p:cNvPicPr>
+          <p:nvPr/>
+        </p:nvPicPr>
+        <p:blipFill>
+          <a:blip r:embed="rId12">
+            <a:extLst>
+              <a:ext uri="{28A0092B-C50C-407E-A947-70E740481C1C}">
+                <a14:useLocalDpi xmlns:a14="http://schemas.microsoft.com/office/drawing/2010/main" val="0"/>
+              </a:ext>
+              <a:ext uri="{96DAC541-7B7A-43D3-8B79-37D633B846F1}">
+                <asvg:svgBlip xmlns:asvg="http://schemas.microsoft.com/office/drawing/2016/SVG/main" r:embed="rId13"/>
+              </a:ext>
+            </a:extLst>
+          </a:blip>
+          <a:stretch>
+            <a:fillRect/>
+          </a:stretch>
+        </p:blipFill>
+        <p:spPr>
+          <a:xfrm>
+            <a:off x="10695478" y="4581535"/>
+            <a:ext cx="671529" cy="671529"/>
+          </a:xfrm>
+          <a:prstGeom prst="rect">
+            <a:avLst/>
+          </a:prstGeom>
+        </p:spPr>
+      </p:pic>
+      <p:sp>
+        <p:nvSpPr>
+          <p:cNvPr id="71" name="CaixaDeTexto 70">
+            <a:extLst>
+              <a:ext uri="{FF2B5EF4-FFF2-40B4-BE49-F238E27FC236}">
+                <a16:creationId xmlns:a16="http://schemas.microsoft.com/office/drawing/2014/main" id="{62044FBC-8AC0-414F-9BEE-5FDA6EE87130}"/>
+              </a:ext>
+            </a:extLst>
+          </p:cNvPr>
+          <p:cNvSpPr txBox="1"/>
+          <p:nvPr/>
+        </p:nvSpPr>
+        <p:spPr>
+          <a:xfrm>
+            <a:off x="10347304" y="5379254"/>
+            <a:ext cx="1626705" cy="369332"/>
+          </a:xfrm>
+          <a:prstGeom prst="rect">
+            <a:avLst/>
+          </a:prstGeom>
+          <a:noFill/>
+        </p:spPr>
+        <p:txBody>
+          <a:bodyPr wrap="square" rtlCol="0">
+            <a:spAutoFit/>
+          </a:bodyPr>
+          <a:lstStyle/>
+          <a:p>
+            <a:r>
+              <a:rPr lang="pt-BR" b="1" dirty="0">
+                <a:solidFill>
+                  <a:schemeClr val="bg1"/>
+                </a:solidFill>
+              </a:rPr>
+              <a:t>DASHBOARD</a:t>
+            </a:r>
+          </a:p>
+        </p:txBody>
+      </p:sp>
+      <p:sp>
+        <p:nvSpPr>
+          <p:cNvPr id="104" name="CaixaDeTexto 103">
+            <a:extLst>
+              <a:ext uri="{FF2B5EF4-FFF2-40B4-BE49-F238E27FC236}">
+                <a16:creationId xmlns:a16="http://schemas.microsoft.com/office/drawing/2014/main" id="{E4916899-C299-4FD1-8052-154B66EFD284}"/>
+              </a:ext>
+            </a:extLst>
+          </p:cNvPr>
+          <p:cNvSpPr txBox="1"/>
+          <p:nvPr/>
+        </p:nvSpPr>
+        <p:spPr>
+          <a:xfrm>
+            <a:off x="8043433" y="128663"/>
+            <a:ext cx="2987811" cy="369332"/>
+          </a:xfrm>
+          <a:prstGeom prst="rect">
+            <a:avLst/>
+          </a:prstGeom>
+          <a:noFill/>
+        </p:spPr>
+        <p:txBody>
+          <a:bodyPr wrap="square" rtlCol="0">
+            <a:spAutoFit/>
+          </a:bodyPr>
+          <a:lstStyle/>
+          <a:p>
+            <a:r>
+              <a:rPr lang="pt-BR" b="1" dirty="0">
+                <a:solidFill>
+                  <a:schemeClr val="bg1"/>
+                </a:solidFill>
+              </a:rPr>
+              <a:t>APLICAÇÃO WEB – Node JS</a:t>
+            </a:r>
+          </a:p>
+        </p:txBody>
+      </p:sp>
+      <p:sp>
+        <p:nvSpPr>
+          <p:cNvPr id="90" name="Retângulo 89">
+            <a:extLst>
+              <a:ext uri="{FF2B5EF4-FFF2-40B4-BE49-F238E27FC236}">
+                <a16:creationId xmlns:a16="http://schemas.microsoft.com/office/drawing/2014/main" id="{1B16EAA4-9BC9-4B9A-8AA8-F09968227729}"/>
               </a:ext>
             </a:extLst>
           </p:cNvPr>
@@ -5260,8 +5847,8 @@
         </p:nvSpPr>
         <p:spPr>
           <a:xfrm>
-            <a:off x="7268455" y="2365917"/>
-            <a:ext cx="1683486" cy="178907"/>
+            <a:off x="9769043" y="2098513"/>
+            <a:ext cx="1683486" cy="234040"/>
           </a:xfrm>
           <a:prstGeom prst="rect">
             <a:avLst/>
@@ -5298,89 +5885,17 @@
             <a:pPr algn="ctr"/>
             <a:r>
               <a:rPr lang="pt-BR" sz="1400" b="1" dirty="0"/>
-              <a:t>JAVA SCRIPT</a:t>
-            </a:r>
-          </a:p>
-        </p:txBody>
-      </p:sp>
-      <p:pic>
-        <p:nvPicPr>
-          <p:cNvPr id="56" name="Imagem 55">
-            <a:extLst>
-              <a:ext uri="{FF2B5EF4-FFF2-40B4-BE49-F238E27FC236}">
-                <a16:creationId xmlns:a16="http://schemas.microsoft.com/office/drawing/2014/main" id="{7E540955-B1B6-4F74-A796-D1AA6AF59430}"/>
-              </a:ext>
-            </a:extLst>
-          </p:cNvPr>
-          <p:cNvPicPr>
-            <a:picLocks noChangeAspect="1"/>
-          </p:cNvPicPr>
-          <p:nvPr/>
-        </p:nvPicPr>
-        <p:blipFill>
-          <a:blip r:embed="rId6">
-            <a:extLst>
-              <a:ext uri="{28A0092B-C50C-407E-A947-70E740481C1C}">
-                <a14:useLocalDpi xmlns:a14="http://schemas.microsoft.com/office/drawing/2010/main" val="0"/>
-              </a:ext>
-            </a:extLst>
-          </a:blip>
-          <a:stretch>
-            <a:fillRect/>
-          </a:stretch>
-        </p:blipFill>
-        <p:spPr>
-          <a:xfrm>
-            <a:off x="7280147" y="2703125"/>
-            <a:ext cx="308399" cy="308399"/>
-          </a:xfrm>
-          <a:prstGeom prst="rect">
-            <a:avLst/>
-          </a:prstGeom>
-        </p:spPr>
-      </p:pic>
-      <p:pic>
-        <p:nvPicPr>
-          <p:cNvPr id="57" name="Imagem 56">
-            <a:extLst>
-              <a:ext uri="{FF2B5EF4-FFF2-40B4-BE49-F238E27FC236}">
-                <a16:creationId xmlns:a16="http://schemas.microsoft.com/office/drawing/2014/main" id="{B4D809C6-1AA6-4566-9378-1BA6930CC924}"/>
-              </a:ext>
-            </a:extLst>
-          </p:cNvPr>
-          <p:cNvPicPr>
-            <a:picLocks noChangeAspect="1"/>
-          </p:cNvPicPr>
-          <p:nvPr/>
-        </p:nvPicPr>
-        <p:blipFill>
-          <a:blip r:embed="rId6">
-            <a:extLst>
-              <a:ext uri="{28A0092B-C50C-407E-A947-70E740481C1C}">
-                <a14:useLocalDpi xmlns:a14="http://schemas.microsoft.com/office/drawing/2010/main" val="0"/>
-              </a:ext>
-            </a:extLst>
-          </a:blip>
-          <a:stretch>
-            <a:fillRect/>
-          </a:stretch>
-        </p:blipFill>
-        <p:spPr>
-          <a:xfrm>
-            <a:off x="9715795" y="2703125"/>
-            <a:ext cx="308399" cy="308399"/>
-          </a:xfrm>
-          <a:prstGeom prst="rect">
-            <a:avLst/>
-          </a:prstGeom>
-        </p:spPr>
-      </p:pic>
-      <p:sp>
-        <p:nvSpPr>
-          <p:cNvPr id="58" name="Retângulo 57">
-            <a:extLst>
-              <a:ext uri="{FF2B5EF4-FFF2-40B4-BE49-F238E27FC236}">
-                <a16:creationId xmlns:a16="http://schemas.microsoft.com/office/drawing/2014/main" id="{25252638-9D65-4178-9ABF-042D6C808208}"/>
+              <a:t>CSS</a:t>
+            </a:r>
+          </a:p>
+        </p:txBody>
+      </p:sp>
+      <p:sp>
+        <p:nvSpPr>
+          <p:cNvPr id="91" name="Retângulo 90">
+            <a:extLst>
+              <a:ext uri="{FF2B5EF4-FFF2-40B4-BE49-F238E27FC236}">
+                <a16:creationId xmlns:a16="http://schemas.microsoft.com/office/drawing/2014/main" id="{EC40B49F-702D-4568-9624-DAA686D0553C}"/>
               </a:ext>
             </a:extLst>
           </p:cNvPr>
@@ -5389,8 +5904,8 @@
         </p:nvSpPr>
         <p:spPr>
           <a:xfrm>
-            <a:off x="9780479" y="1294080"/>
-            <a:ext cx="1683486" cy="508216"/>
+            <a:off x="9780479" y="2506026"/>
+            <a:ext cx="1683486" cy="178907"/>
           </a:xfrm>
           <a:prstGeom prst="rect">
             <a:avLst/>
@@ -5427,152 +5942,17 @@
             <a:pPr algn="ctr"/>
             <a:r>
               <a:rPr lang="pt-BR" sz="1400" b="1" dirty="0"/>
-              <a:t>CHART JS</a:t>
-            </a:r>
-          </a:p>
-        </p:txBody>
-      </p:sp>
-      <p:sp>
-        <p:nvSpPr>
-          <p:cNvPr id="60" name="Retângulo 59">
-            <a:extLst>
-              <a:ext uri="{FF2B5EF4-FFF2-40B4-BE49-F238E27FC236}">
-                <a16:creationId xmlns:a16="http://schemas.microsoft.com/office/drawing/2014/main" id="{ABEC5C7F-CD6D-4E68-925D-0AB98EE242AD}"/>
-              </a:ext>
-            </a:extLst>
-          </p:cNvPr>
-          <p:cNvSpPr/>
-          <p:nvPr/>
-        </p:nvSpPr>
-        <p:spPr>
-          <a:xfrm>
-            <a:off x="9780479" y="1944621"/>
-            <a:ext cx="1683486" cy="508216"/>
-          </a:xfrm>
-          <a:prstGeom prst="rect">
-            <a:avLst/>
-          </a:prstGeom>
-          <a:solidFill>
-            <a:srgbClr val="C00000"/>
-          </a:solidFill>
-          <a:ln>
-            <a:solidFill>
-              <a:srgbClr val="C00000"/>
-            </a:solidFill>
-          </a:ln>
-        </p:spPr>
-        <p:style>
-          <a:lnRef idx="2">
-            <a:schemeClr val="dk1">
-              <a:shade val="50000"/>
-            </a:schemeClr>
-          </a:lnRef>
-          <a:fillRef idx="1">
-            <a:schemeClr val="dk1"/>
-          </a:fillRef>
-          <a:effectRef idx="0">
-            <a:schemeClr val="dk1"/>
-          </a:effectRef>
-          <a:fontRef idx="minor">
-            <a:schemeClr val="lt1"/>
-          </a:fontRef>
-        </p:style>
-        <p:txBody>
-          <a:bodyPr rtlCol="0" anchor="ctr"/>
-          <a:lstStyle/>
-          <a:p>
-            <a:pPr algn="ctr"/>
-            <a:r>
-              <a:rPr lang="pt-BR" sz="1400" b="1" dirty="0"/>
-              <a:t>SEQUELIZE</a:t>
-            </a:r>
-          </a:p>
-        </p:txBody>
-      </p:sp>
-      <p:pic>
-        <p:nvPicPr>
-          <p:cNvPr id="63" name="Gráfico 62" descr="Gráfico de pizza">
-            <a:extLst>
-              <a:ext uri="{FF2B5EF4-FFF2-40B4-BE49-F238E27FC236}">
-                <a16:creationId xmlns:a16="http://schemas.microsoft.com/office/drawing/2014/main" id="{46307574-571F-42FA-99E2-BAD01F954F36}"/>
-              </a:ext>
-            </a:extLst>
-          </p:cNvPr>
-          <p:cNvPicPr>
-            <a:picLocks noChangeAspect="1"/>
-          </p:cNvPicPr>
-          <p:nvPr/>
-        </p:nvPicPr>
-        <p:blipFill>
-          <a:blip r:embed="rId13">
-            <a:extLst>
-              <a:ext uri="{28A0092B-C50C-407E-A947-70E740481C1C}">
-                <a14:useLocalDpi xmlns:a14="http://schemas.microsoft.com/office/drawing/2010/main" val="0"/>
-              </a:ext>
-              <a:ext uri="{96DAC541-7B7A-43D3-8B79-37D633B846F1}">
-                <asvg:svgBlip xmlns:asvg="http://schemas.microsoft.com/office/drawing/2016/SVG/main" r:embed="rId14"/>
-              </a:ext>
-            </a:extLst>
-          </a:blip>
-          <a:stretch>
-            <a:fillRect/>
-          </a:stretch>
-        </p:blipFill>
-        <p:spPr>
-          <a:xfrm>
-            <a:off x="10695478" y="4581535"/>
-            <a:ext cx="671529" cy="671529"/>
-          </a:xfrm>
-          <a:prstGeom prst="rect">
-            <a:avLst/>
-          </a:prstGeom>
-        </p:spPr>
-      </p:pic>
-      <p:pic>
-        <p:nvPicPr>
-          <p:cNvPr id="67" name="Gráfico 66" descr="Usuários">
-            <a:extLst>
-              <a:ext uri="{FF2B5EF4-FFF2-40B4-BE49-F238E27FC236}">
-                <a16:creationId xmlns:a16="http://schemas.microsoft.com/office/drawing/2014/main" id="{2976F1BC-F7B7-4815-91AC-97DD8565822B}"/>
-              </a:ext>
-            </a:extLst>
-          </p:cNvPr>
-          <p:cNvPicPr>
-            <a:picLocks noChangeAspect="1"/>
-          </p:cNvPicPr>
-          <p:nvPr/>
-        </p:nvPicPr>
-        <p:blipFill>
-          <a:blip r:embed="rId15">
-            <a:extLst>
-              <a:ext uri="{28A0092B-C50C-407E-A947-70E740481C1C}">
-                <a14:useLocalDpi xmlns:a14="http://schemas.microsoft.com/office/drawing/2010/main" val="0"/>
-              </a:ext>
-              <a:ext uri="{96DAC541-7B7A-43D3-8B79-37D633B846F1}">
-                <asvg:svgBlip xmlns:asvg="http://schemas.microsoft.com/office/drawing/2016/SVG/main" r:embed="rId16"/>
-              </a:ext>
-            </a:extLst>
-          </a:blip>
-          <a:stretch>
-            <a:fillRect/>
-          </a:stretch>
-        </p:blipFill>
-        <p:spPr>
-          <a:xfrm>
-            <a:off x="7987684" y="4602013"/>
-            <a:ext cx="719066" cy="719066"/>
-          </a:xfrm>
-          <a:prstGeom prst="rect">
-            <a:avLst/>
-          </a:prstGeom>
-        </p:spPr>
-      </p:pic>
-      <p:sp>
-        <p:nvSpPr>
-          <p:cNvPr id="68" name="CaixaDeTexto 67">
-            <a:extLst>
-              <a:ext uri="{FF2B5EF4-FFF2-40B4-BE49-F238E27FC236}">
-                <a16:creationId xmlns:a16="http://schemas.microsoft.com/office/drawing/2014/main" id="{D313590B-D6BD-4463-8DFD-BC8B41F29C70}"/>
+              <a:t>JAVA SCRIPT</a:t>
+            </a:r>
+          </a:p>
+        </p:txBody>
+      </p:sp>
+      <p:sp>
+        <p:nvSpPr>
+          <p:cNvPr id="2" name="CaixaDeTexto 1">
+            <a:extLst>
+              <a:ext uri="{FF2B5EF4-FFF2-40B4-BE49-F238E27FC236}">
+                <a16:creationId xmlns:a16="http://schemas.microsoft.com/office/drawing/2014/main" id="{EA344BFF-558E-4F04-B2FA-599C5CA47AF6}"/>
               </a:ext>
             </a:extLst>
           </p:cNvPr>
@@ -5581,8 +5961,8 @@
         </p:nvSpPr>
         <p:spPr>
           <a:xfrm>
-            <a:off x="7769887" y="5392734"/>
-            <a:ext cx="1324729" cy="369332"/>
+            <a:off x="923580" y="3655882"/>
+            <a:ext cx="994845" cy="369332"/>
           </a:xfrm>
           <a:prstGeom prst="rect">
             <a:avLst/>
@@ -5601,199 +5981,36 @@
                   <a:schemeClr val="bg1"/>
                 </a:solidFill>
               </a:rPr>
-              <a:t>CADASTRO</a:t>
-            </a:r>
-          </a:p>
-        </p:txBody>
-      </p:sp>
-      <p:sp>
-        <p:nvSpPr>
-          <p:cNvPr id="71" name="CaixaDeTexto 70">
-            <a:extLst>
-              <a:ext uri="{FF2B5EF4-FFF2-40B4-BE49-F238E27FC236}">
-                <a16:creationId xmlns:a16="http://schemas.microsoft.com/office/drawing/2014/main" id="{62044FBC-8AC0-414F-9BEE-5FDA6EE87130}"/>
-              </a:ext>
-            </a:extLst>
-          </p:cNvPr>
-          <p:cNvSpPr txBox="1"/>
-          <p:nvPr/>
-        </p:nvSpPr>
-        <p:spPr>
-          <a:xfrm>
-            <a:off x="10347304" y="5379254"/>
-            <a:ext cx="1626705" cy="369332"/>
-          </a:xfrm>
-          <a:prstGeom prst="rect">
-            <a:avLst/>
-          </a:prstGeom>
-          <a:noFill/>
-        </p:spPr>
-        <p:txBody>
-          <a:bodyPr wrap="square" rtlCol="0">
-            <a:spAutoFit/>
-          </a:bodyPr>
-          <a:lstStyle/>
-          <a:p>
-            <a:r>
-              <a:rPr lang="pt-BR" b="1" dirty="0">
-                <a:solidFill>
-                  <a:schemeClr val="bg1"/>
-                </a:solidFill>
-              </a:rPr>
-              <a:t>DASHBOARD</a:t>
-            </a:r>
-          </a:p>
-        </p:txBody>
-      </p:sp>
-      <p:pic>
-        <p:nvPicPr>
-          <p:cNvPr id="76" name="Gráfico 75" descr="Pasta aberta">
-            <a:extLst>
-              <a:ext uri="{FF2B5EF4-FFF2-40B4-BE49-F238E27FC236}">
-                <a16:creationId xmlns:a16="http://schemas.microsoft.com/office/drawing/2014/main" id="{9A35AC5C-7A18-4012-B91D-98B95E062815}"/>
-              </a:ext>
-            </a:extLst>
-          </p:cNvPr>
-          <p:cNvPicPr>
-            <a:picLocks noChangeAspect="1"/>
-          </p:cNvPicPr>
-          <p:nvPr/>
-        </p:nvPicPr>
-        <p:blipFill>
-          <a:blip r:embed="rId17">
-            <a:extLst>
-              <a:ext uri="{28A0092B-C50C-407E-A947-70E740481C1C}">
-                <a14:useLocalDpi xmlns:a14="http://schemas.microsoft.com/office/drawing/2010/main" val="0"/>
-              </a:ext>
-              <a:ext uri="{96DAC541-7B7A-43D3-8B79-37D633B846F1}">
-                <asvg:svgBlip xmlns:asvg="http://schemas.microsoft.com/office/drawing/2016/SVG/main" r:embed="rId18"/>
-              </a:ext>
-            </a:extLst>
-          </a:blip>
-          <a:stretch>
-            <a:fillRect/>
-          </a:stretch>
-        </p:blipFill>
-        <p:spPr>
-          <a:xfrm>
-            <a:off x="394981" y="736938"/>
-            <a:ext cx="929783" cy="929783"/>
-          </a:xfrm>
-          <a:prstGeom prst="rect">
-            <a:avLst/>
-          </a:prstGeom>
-        </p:spPr>
-      </p:pic>
-      <p:sp>
-        <p:nvSpPr>
-          <p:cNvPr id="74" name="CaixaDeTexto 73">
-            <a:extLst>
-              <a:ext uri="{FF2B5EF4-FFF2-40B4-BE49-F238E27FC236}">
-                <a16:creationId xmlns:a16="http://schemas.microsoft.com/office/drawing/2014/main" id="{2D344E60-8A25-420F-A7E0-AB6244E11D38}"/>
-              </a:ext>
-            </a:extLst>
-          </p:cNvPr>
-          <p:cNvSpPr txBox="1"/>
-          <p:nvPr/>
-        </p:nvSpPr>
-        <p:spPr>
-          <a:xfrm>
-            <a:off x="484356" y="1124803"/>
-            <a:ext cx="884612" cy="338554"/>
-          </a:xfrm>
-          <a:prstGeom prst="rect">
-            <a:avLst/>
-          </a:prstGeom>
-          <a:noFill/>
-        </p:spPr>
-        <p:txBody>
-          <a:bodyPr wrap="square" rtlCol="0">
-            <a:spAutoFit/>
-          </a:bodyPr>
-          <a:lstStyle/>
-          <a:p>
-            <a:pPr algn="ctr"/>
-            <a:r>
-              <a:rPr lang="pt-BR" sz="1600" b="1" dirty="0">
-                <a:solidFill>
-                  <a:schemeClr val="bg1"/>
-                </a:solidFill>
-              </a:rPr>
-              <a:t>JAVA</a:t>
-            </a:r>
-            <a:endParaRPr lang="pt-BR" b="1" dirty="0">
-              <a:solidFill>
-                <a:schemeClr val="bg1"/>
-              </a:solidFill>
-            </a:endParaRPr>
+              <a:t>Heroku</a:t>
+            </a:r>
           </a:p>
         </p:txBody>
       </p:sp>
       <p:cxnSp>
         <p:nvCxnSpPr>
-          <p:cNvPr id="79" name="Conector: Angulado 78">
-            <a:extLst>
-              <a:ext uri="{FF2B5EF4-FFF2-40B4-BE49-F238E27FC236}">
-                <a16:creationId xmlns:a16="http://schemas.microsoft.com/office/drawing/2014/main" id="{1EEF0E6B-926A-4EF2-ACD0-C410BBA0A789}"/>
+          <p:cNvPr id="18" name="Conector: Angulado 17">
+            <a:extLst>
+              <a:ext uri="{FF2B5EF4-FFF2-40B4-BE49-F238E27FC236}">
+                <a16:creationId xmlns:a16="http://schemas.microsoft.com/office/drawing/2014/main" id="{71F240BE-7D0A-402A-9514-6F6D77ABCB08}"/>
               </a:ext>
             </a:extLst>
           </p:cNvPr>
           <p:cNvCxnSpPr>
-            <a:endCxn id="76" idx="2"/>
+            <a:cxnSpLocks/>
+            <a:stCxn id="60" idx="1"/>
+            <a:endCxn id="12" idx="3"/>
           </p:cNvCxnSpPr>
           <p:nvPr/>
         </p:nvCxnSpPr>
         <p:spPr>
           <a:xfrm rot="10800000">
-            <a:off x="859873" y="1666722"/>
-            <a:ext cx="1338552" cy="598087"/>
-          </a:xfrm>
-          <a:prstGeom prst="bentConnector2">
-            <a:avLst/>
-          </a:prstGeom>
-          <a:ln w="28575">
-            <a:solidFill>
-              <a:srgbClr val="C00000"/>
-            </a:solidFill>
-            <a:tailEnd type="triangle"/>
-          </a:ln>
-        </p:spPr>
-        <p:style>
-          <a:lnRef idx="1">
-            <a:schemeClr val="accent2"/>
-          </a:lnRef>
-          <a:fillRef idx="0">
-            <a:schemeClr val="accent2"/>
-          </a:fillRef>
-          <a:effectRef idx="0">
-            <a:schemeClr val="accent2"/>
-          </a:effectRef>
-          <a:fontRef idx="minor">
-            <a:schemeClr val="tx1"/>
-          </a:fontRef>
-        </p:style>
-      </p:cxnSp>
-      <p:cxnSp>
-        <p:nvCxnSpPr>
-          <p:cNvPr id="83" name="Conector de Seta Reta 82">
-            <a:extLst>
-              <a:ext uri="{FF2B5EF4-FFF2-40B4-BE49-F238E27FC236}">
-                <a16:creationId xmlns:a16="http://schemas.microsoft.com/office/drawing/2014/main" id="{00DE8892-39EC-46CA-B5D1-DE21F52272A3}"/>
-              </a:ext>
-            </a:extLst>
-          </p:cNvPr>
-          <p:cNvCxnSpPr>
-            <a:cxnSpLocks/>
-          </p:cNvCxnSpPr>
-          <p:nvPr/>
-        </p:nvCxnSpPr>
-        <p:spPr>
-          <a:xfrm>
-            <a:off x="2264229" y="2840205"/>
-            <a:ext cx="0" cy="1990980"/>
-          </a:xfrm>
-          <a:prstGeom prst="straightConnector1">
-            <a:avLst/>
+            <a:off x="3867755" y="2292827"/>
+            <a:ext cx="3373727" cy="101480"/>
+          </a:xfrm>
+          <a:prstGeom prst="bentConnector3">
+            <a:avLst>
+              <a:gd name="adj1" fmla="val 7596"/>
+            </a:avLst>
           </a:prstGeom>
           <a:ln w="28575">
             <a:solidFill>
@@ -5819,27 +6036,26 @@
       </p:cxnSp>
       <p:cxnSp>
         <p:nvCxnSpPr>
-          <p:cNvPr id="85" name="Conector: Angulado 84">
-            <a:extLst>
-              <a:ext uri="{FF2B5EF4-FFF2-40B4-BE49-F238E27FC236}">
-                <a16:creationId xmlns:a16="http://schemas.microsoft.com/office/drawing/2014/main" id="{E730CFE0-862E-4098-9461-7AE23C880AF5}"/>
+          <p:cNvPr id="25" name="Conector: Angulado 24">
+            <a:extLst>
+              <a:ext uri="{FF2B5EF4-FFF2-40B4-BE49-F238E27FC236}">
+                <a16:creationId xmlns:a16="http://schemas.microsoft.com/office/drawing/2014/main" id="{F31B572D-9129-4CEF-88EE-544810AD6C2D}"/>
               </a:ext>
             </a:extLst>
           </p:cNvPr>
           <p:cNvCxnSpPr>
-            <a:cxnSpLocks/>
+            <a:stCxn id="40" idx="1"/>
+            <a:endCxn id="12" idx="2"/>
           </p:cNvCxnSpPr>
           <p:nvPr/>
         </p:nvCxnSpPr>
         <p:spPr>
-          <a:xfrm rot="16200000" flipV="1">
-            <a:off x="2048079" y="3275800"/>
-            <a:ext cx="1714625" cy="843437"/>
-          </a:xfrm>
-          <a:prstGeom prst="bentConnector3">
-            <a:avLst>
-              <a:gd name="adj1" fmla="val 25674"/>
-            </a:avLst>
+          <a:xfrm rot="10800000">
+            <a:off x="2842229" y="3202119"/>
+            <a:ext cx="2195208" cy="1497070"/>
+          </a:xfrm>
+          <a:prstGeom prst="bentConnector2">
+            <a:avLst/>
           </a:prstGeom>
           <a:ln w="28575">
             <a:solidFill>
@@ -5865,28 +6081,26 @@
       </p:cxnSp>
       <p:cxnSp>
         <p:nvCxnSpPr>
-          <p:cNvPr id="100" name="Conector: Angulado 99">
-            <a:extLst>
-              <a:ext uri="{FF2B5EF4-FFF2-40B4-BE49-F238E27FC236}">
-                <a16:creationId xmlns:a16="http://schemas.microsoft.com/office/drawing/2014/main" id="{0FEEB5E4-9259-4123-B406-F13CACFD5325}"/>
+          <p:cNvPr id="45" name="Conector: Angulado 44">
+            <a:extLst>
+              <a:ext uri="{FF2B5EF4-FFF2-40B4-BE49-F238E27FC236}">
+                <a16:creationId xmlns:a16="http://schemas.microsoft.com/office/drawing/2014/main" id="{7EF3767C-B9DB-4D6F-BD43-E2076B780399}"/>
               </a:ext>
             </a:extLst>
           </p:cNvPr>
           <p:cNvCxnSpPr>
-            <a:stCxn id="11" idx="2"/>
-            <a:endCxn id="40" idx="0"/>
+            <a:stCxn id="64" idx="2"/>
+            <a:endCxn id="36" idx="1"/>
           </p:cNvCxnSpPr>
           <p:nvPr/>
         </p:nvCxnSpPr>
         <p:spPr>
           <a:xfrm rot="16200000" flipH="1">
-            <a:off x="3923887" y="2232089"/>
-            <a:ext cx="1508469" cy="2734727"/>
-          </a:xfrm>
-          <a:prstGeom prst="bentConnector3">
-            <a:avLst>
-              <a:gd name="adj1" fmla="val 40429"/>
-            </a:avLst>
+            <a:off x="2722679" y="3604564"/>
+            <a:ext cx="1065919" cy="3573508"/>
+          </a:xfrm>
+          <a:prstGeom prst="bentConnector2">
+            <a:avLst/>
           </a:prstGeom>
           <a:ln w="28575">
             <a:solidFill>
@@ -5912,154 +6126,28 @@
       </p:cxnSp>
       <p:cxnSp>
         <p:nvCxnSpPr>
-          <p:cNvPr id="102" name="Conector de Seta Reta 101">
-            <a:extLst>
-              <a:ext uri="{FF2B5EF4-FFF2-40B4-BE49-F238E27FC236}">
-                <a16:creationId xmlns:a16="http://schemas.microsoft.com/office/drawing/2014/main" id="{5989CE9E-3DE0-4500-989E-12C5F05700EE}"/>
+          <p:cNvPr id="52" name="Conector: Angulado 51">
+            <a:extLst>
+              <a:ext uri="{FF2B5EF4-FFF2-40B4-BE49-F238E27FC236}">
+                <a16:creationId xmlns:a16="http://schemas.microsoft.com/office/drawing/2014/main" id="{08869450-1636-448C-90EA-2A234BA4A565}"/>
               </a:ext>
             </a:extLst>
           </p:cNvPr>
           <p:cNvCxnSpPr>
             <a:cxnSpLocks/>
+            <a:stCxn id="64" idx="1"/>
+            <a:endCxn id="109" idx="1"/>
           </p:cNvCxnSpPr>
           <p:nvPr/>
         </p:nvCxnSpPr>
         <p:spPr>
-          <a:xfrm>
-            <a:off x="4937479" y="1944621"/>
-            <a:ext cx="1469873" cy="7952"/>
-          </a:xfrm>
-          <a:prstGeom prst="straightConnector1">
-            <a:avLst/>
-          </a:prstGeom>
-          <a:ln w="38100">
-            <a:solidFill>
-              <a:srgbClr val="C00000"/>
-            </a:solidFill>
-            <a:headEnd type="triangle"/>
-            <a:tailEnd type="triangle"/>
-          </a:ln>
-        </p:spPr>
-        <p:style>
-          <a:lnRef idx="1">
-            <a:schemeClr val="accent1"/>
-          </a:lnRef>
-          <a:fillRef idx="0">
-            <a:schemeClr val="accent1"/>
-          </a:fillRef>
-          <a:effectRef idx="0">
-            <a:schemeClr val="accent1"/>
-          </a:effectRef>
-          <a:fontRef idx="minor">
-            <a:schemeClr val="tx1"/>
-          </a:fontRef>
-        </p:style>
-      </p:cxnSp>
-      <p:sp>
-        <p:nvSpPr>
-          <p:cNvPr id="104" name="CaixaDeTexto 103">
-            <a:extLst>
-              <a:ext uri="{FF2B5EF4-FFF2-40B4-BE49-F238E27FC236}">
-                <a16:creationId xmlns:a16="http://schemas.microsoft.com/office/drawing/2014/main" id="{E4916899-C299-4FD1-8052-154B66EFD284}"/>
-              </a:ext>
-            </a:extLst>
-          </p:cNvPr>
-          <p:cNvSpPr txBox="1"/>
-          <p:nvPr/>
-        </p:nvSpPr>
-        <p:spPr>
-          <a:xfrm>
-            <a:off x="8043434" y="128663"/>
-            <a:ext cx="2051050" cy="369332"/>
-          </a:xfrm>
-          <a:prstGeom prst="rect">
-            <a:avLst/>
-          </a:prstGeom>
-          <a:noFill/>
-        </p:spPr>
-        <p:txBody>
-          <a:bodyPr wrap="square" rtlCol="0">
-            <a:spAutoFit/>
-          </a:bodyPr>
-          <a:lstStyle/>
-          <a:p>
-            <a:r>
-              <a:rPr lang="pt-BR" b="1" dirty="0">
-                <a:solidFill>
-                  <a:schemeClr val="bg1"/>
-                </a:solidFill>
-              </a:rPr>
-              <a:t>APLICAÇÃO WEB</a:t>
-            </a:r>
-          </a:p>
-        </p:txBody>
-      </p:sp>
-      <p:cxnSp>
-        <p:nvCxnSpPr>
-          <p:cNvPr id="106" name="Conector: Angulado 105">
-            <a:extLst>
-              <a:ext uri="{FF2B5EF4-FFF2-40B4-BE49-F238E27FC236}">
-                <a16:creationId xmlns:a16="http://schemas.microsoft.com/office/drawing/2014/main" id="{7B6750B3-8EDB-43B1-A606-A115A4D6C87B}"/>
-              </a:ext>
-            </a:extLst>
-          </p:cNvPr>
-          <p:cNvCxnSpPr>
-            <a:cxnSpLocks/>
-          </p:cNvCxnSpPr>
-          <p:nvPr/>
-        </p:nvCxnSpPr>
-        <p:spPr>
-          <a:xfrm rot="5400000">
-            <a:off x="8900709" y="2561800"/>
-            <a:ext cx="1203283" cy="2239744"/>
-          </a:xfrm>
-          <a:prstGeom prst="bentConnector3">
-            <a:avLst/>
-          </a:prstGeom>
-          <a:ln w="28575">
-            <a:solidFill>
-              <a:srgbClr val="C00000"/>
-            </a:solidFill>
-            <a:tailEnd type="triangle"/>
-          </a:ln>
-        </p:spPr>
-        <p:style>
-          <a:lnRef idx="1">
-            <a:schemeClr val="accent1"/>
-          </a:lnRef>
-          <a:fillRef idx="0">
-            <a:schemeClr val="accent1"/>
-          </a:fillRef>
-          <a:effectRef idx="0">
-            <a:schemeClr val="accent1"/>
-          </a:effectRef>
-          <a:fontRef idx="minor">
-            <a:schemeClr val="tx1"/>
-          </a:fontRef>
-        </p:style>
-      </p:cxnSp>
-      <p:cxnSp>
-        <p:nvCxnSpPr>
-          <p:cNvPr id="108" name="Conector: Angulado 107">
-            <a:extLst>
-              <a:ext uri="{FF2B5EF4-FFF2-40B4-BE49-F238E27FC236}">
-                <a16:creationId xmlns:a16="http://schemas.microsoft.com/office/drawing/2014/main" id="{E512B903-BA4F-462E-AC16-CF80C3F9F061}"/>
-              </a:ext>
-            </a:extLst>
-          </p:cNvPr>
-          <p:cNvCxnSpPr>
-            <a:endCxn id="72" idx="0"/>
-          </p:cNvCxnSpPr>
-          <p:nvPr/>
-        </p:nvCxnSpPr>
-        <p:spPr>
-          <a:xfrm rot="16200000" flipH="1">
-            <a:off x="10244174" y="3482593"/>
-            <a:ext cx="1165119" cy="409022"/>
+          <a:xfrm rot="10800000" flipV="1">
+            <a:off x="344558" y="4463105"/>
+            <a:ext cx="127127" cy="1846878"/>
           </a:xfrm>
           <a:prstGeom prst="bentConnector3">
             <a:avLst>
-              <a:gd name="adj1" fmla="val -2321"/>
+              <a:gd name="adj1" fmla="val 279820"/>
             </a:avLst>
           </a:prstGeom>
           <a:ln w="28575">
@@ -6390,4 +6478,299 @@
     </a:ext>
   </a:extLst>
 </a:theme>
+</file>
+
+<file path=ppt/theme/theme2.xml><?xml version="1.0" encoding="utf-8"?>
+<a:theme xmlns:a="http://schemas.openxmlformats.org/drawingml/2006/main" name="Tema do Office">
+  <a:themeElements>
+    <a:clrScheme name="Office">
+      <a:dk1>
+        <a:sysClr val="windowText" lastClr="000000"/>
+      </a:dk1>
+      <a:lt1>
+        <a:sysClr val="window" lastClr="FFFFFF"/>
+      </a:lt1>
+      <a:dk2>
+        <a:srgbClr val="44546A"/>
+      </a:dk2>
+      <a:lt2>
+        <a:srgbClr val="E7E6E6"/>
+      </a:lt2>
+      <a:accent1>
+        <a:srgbClr val="4472C4"/>
+      </a:accent1>
+      <a:accent2>
+        <a:srgbClr val="ED7D31"/>
+      </a:accent2>
+      <a:accent3>
+        <a:srgbClr val="A5A5A5"/>
+      </a:accent3>
+      <a:accent4>
+        <a:srgbClr val="FFC000"/>
+      </a:accent4>
+      <a:accent5>
+        <a:srgbClr val="5B9BD5"/>
+      </a:accent5>
+      <a:accent6>
+        <a:srgbClr val="70AD47"/>
+      </a:accent6>
+      <a:hlink>
+        <a:srgbClr val="0563C1"/>
+      </a:hlink>
+      <a:folHlink>
+        <a:srgbClr val="954F72"/>
+      </a:folHlink>
+    </a:clrScheme>
+    <a:fontScheme name="Office">
+      <a:majorFont>
+        <a:latin typeface="Calibri Light" panose="020F0302020204030204"/>
+        <a:ea typeface=""/>
+        <a:cs typeface=""/>
+        <a:font script="Jpan" typeface="游ゴシック Light"/>
+        <a:font script="Hang" typeface="맑은 고딕"/>
+        <a:font script="Hans" typeface="等线 Light"/>
+        <a:font script="Hant" typeface="新細明體"/>
+        <a:font script="Arab" typeface="Times New Roman"/>
+        <a:font script="Hebr" typeface="Times New Roman"/>
+        <a:font script="Thai" typeface="Angsana New"/>
+        <a:font script="Ethi" typeface="Nyala"/>
+        <a:font script="Beng" typeface="Vrinda"/>
+        <a:font script="Gujr" typeface="Shruti"/>
+        <a:font script="Khmr" typeface="MoolBoran"/>
+        <a:font script="Knda" typeface="Tunga"/>
+        <a:font script="Guru" typeface="Raavi"/>
+        <a:font script="Cans" typeface="Euphemia"/>
+        <a:font script="Cher" typeface="Plantagenet Cherokee"/>
+        <a:font script="Yiii" typeface="Microsoft Yi Baiti"/>
+        <a:font script="Tibt" typeface="Microsoft Himalaya"/>
+        <a:font script="Thaa" typeface="MV Boli"/>
+        <a:font script="Deva" typeface="Mangal"/>
+        <a:font script="Telu" typeface="Gautami"/>
+        <a:font script="Taml" typeface="Latha"/>
+        <a:font script="Syrc" typeface="Estrangelo Edessa"/>
+        <a:font script="Orya" typeface="Kalinga"/>
+        <a:font script="Mlym" typeface="Kartika"/>
+        <a:font script="Laoo" typeface="DokChampa"/>
+        <a:font script="Sinh" typeface="Iskoola Pota"/>
+        <a:font script="Mong" typeface="Mongolian Baiti"/>
+        <a:font script="Viet" typeface="Times New Roman"/>
+        <a:font script="Uigh" typeface="Microsoft Uighur"/>
+        <a:font script="Geor" typeface="Sylfaen"/>
+        <a:font script="Armn" typeface="Arial"/>
+        <a:font script="Bugi" typeface="Leelawadee UI"/>
+        <a:font script="Bopo" typeface="Microsoft JhengHei"/>
+        <a:font script="Java" typeface="Javanese Text"/>
+        <a:font script="Lisu" typeface="Segoe UI"/>
+        <a:font script="Mymr" typeface="Myanmar Text"/>
+        <a:font script="Nkoo" typeface="Ebrima"/>
+        <a:font script="Olck" typeface="Nirmala UI"/>
+        <a:font script="Osma" typeface="Ebrima"/>
+        <a:font script="Phag" typeface="Phagspa"/>
+        <a:font script="Syrn" typeface="Estrangelo Edessa"/>
+        <a:font script="Syrj" typeface="Estrangelo Edessa"/>
+        <a:font script="Syre" typeface="Estrangelo Edessa"/>
+        <a:font script="Sora" typeface="Nirmala UI"/>
+        <a:font script="Tale" typeface="Microsoft Tai Le"/>
+        <a:font script="Talu" typeface="Microsoft New Tai Lue"/>
+        <a:font script="Tfng" typeface="Ebrima"/>
+      </a:majorFont>
+      <a:minorFont>
+        <a:latin typeface="Calibri" panose="020F0502020204030204"/>
+        <a:ea typeface=""/>
+        <a:cs typeface=""/>
+        <a:font script="Jpan" typeface="游ゴシック"/>
+        <a:font script="Hang" typeface="맑은 고딕"/>
+        <a:font script="Hans" typeface="等线"/>
+        <a:font script="Hant" typeface="新細明體"/>
+        <a:font script="Arab" typeface="Arial"/>
+        <a:font script="Hebr" typeface="Arial"/>
+        <a:font script="Thai" typeface="Cordia New"/>
+        <a:font script="Ethi" typeface="Nyala"/>
+        <a:font script="Beng" typeface="Vrinda"/>
+        <a:font script="Gujr" typeface="Shruti"/>
+        <a:font script="Khmr" typeface="DaunPenh"/>
+        <a:font script="Knda" typeface="Tunga"/>
+        <a:font script="Guru" typeface="Raavi"/>
+        <a:font script="Cans" typeface="Euphemia"/>
+        <a:font script="Cher" typeface="Plantagenet Cherokee"/>
+        <a:font script="Yiii" typeface="Microsoft Yi Baiti"/>
+        <a:font script="Tibt" typeface="Microsoft Himalaya"/>
+        <a:font script="Thaa" typeface="MV Boli"/>
+        <a:font script="Deva" typeface="Mangal"/>
+        <a:font script="Telu" typeface="Gautami"/>
+        <a:font script="Taml" typeface="Latha"/>
+        <a:font script="Syrc" typeface="Estrangelo Edessa"/>
+        <a:font script="Orya" typeface="Kalinga"/>
+        <a:font script="Mlym" typeface="Kartika"/>
+        <a:font script="Laoo" typeface="DokChampa"/>
+        <a:font script="Sinh" typeface="Iskoola Pota"/>
+        <a:font script="Mong" typeface="Mongolian Baiti"/>
+        <a:font script="Viet" typeface="Arial"/>
+        <a:font script="Uigh" typeface="Microsoft Uighur"/>
+        <a:font script="Geor" typeface="Sylfaen"/>
+        <a:font script="Armn" typeface="Arial"/>
+        <a:font script="Bugi" typeface="Leelawadee UI"/>
+        <a:font script="Bopo" typeface="Microsoft JhengHei"/>
+        <a:font script="Java" typeface="Javanese Text"/>
+        <a:font script="Lisu" typeface="Segoe UI"/>
+        <a:font script="Mymr" typeface="Myanmar Text"/>
+        <a:font script="Nkoo" typeface="Ebrima"/>
+        <a:font script="Olck" typeface="Nirmala UI"/>
+        <a:font script="Osma" typeface="Ebrima"/>
+        <a:font script="Phag" typeface="Phagspa"/>
+        <a:font script="Syrn" typeface="Estrangelo Edessa"/>
+        <a:font script="Syrj" typeface="Estrangelo Edessa"/>
+        <a:font script="Syre" typeface="Estrangelo Edessa"/>
+        <a:font script="Sora" typeface="Nirmala UI"/>
+        <a:font script="Tale" typeface="Microsoft Tai Le"/>
+        <a:font script="Talu" typeface="Microsoft New Tai Lue"/>
+        <a:font script="Tfng" typeface="Ebrima"/>
+      </a:minorFont>
+    </a:fontScheme>
+    <a:fmtScheme name="Office">
+      <a:fillStyleLst>
+        <a:solidFill>
+          <a:schemeClr val="phClr"/>
+        </a:solidFill>
+        <a:gradFill rotWithShape="1">
+          <a:gsLst>
+            <a:gs pos="0">
+              <a:schemeClr val="phClr">
+                <a:lumMod val="110000"/>
+                <a:satMod val="105000"/>
+                <a:tint val="67000"/>
+              </a:schemeClr>
+            </a:gs>
+            <a:gs pos="50000">
+              <a:schemeClr val="phClr">
+                <a:lumMod val="105000"/>
+                <a:satMod val="103000"/>
+                <a:tint val="73000"/>
+              </a:schemeClr>
+            </a:gs>
+            <a:gs pos="100000">
+              <a:schemeClr val="phClr">
+                <a:lumMod val="105000"/>
+                <a:satMod val="109000"/>
+                <a:tint val="81000"/>
+              </a:schemeClr>
+            </a:gs>
+          </a:gsLst>
+          <a:lin ang="5400000" scaled="0"/>
+        </a:gradFill>
+        <a:gradFill rotWithShape="1">
+          <a:gsLst>
+            <a:gs pos="0">
+              <a:schemeClr val="phClr">
+                <a:satMod val="103000"/>
+                <a:lumMod val="102000"/>
+                <a:tint val="94000"/>
+              </a:schemeClr>
+            </a:gs>
+            <a:gs pos="50000">
+              <a:schemeClr val="phClr">
+                <a:satMod val="110000"/>
+                <a:lumMod val="100000"/>
+                <a:shade val="100000"/>
+              </a:schemeClr>
+            </a:gs>
+            <a:gs pos="100000">
+              <a:schemeClr val="phClr">
+                <a:lumMod val="99000"/>
+                <a:satMod val="120000"/>
+                <a:shade val="78000"/>
+              </a:schemeClr>
+            </a:gs>
+          </a:gsLst>
+          <a:lin ang="5400000" scaled="0"/>
+        </a:gradFill>
+      </a:fillStyleLst>
+      <a:lnStyleLst>
+        <a:ln w="6350" cap="flat" cmpd="sng" algn="ctr">
+          <a:solidFill>
+            <a:schemeClr val="phClr"/>
+          </a:solidFill>
+          <a:prstDash val="solid"/>
+          <a:miter lim="800000"/>
+        </a:ln>
+        <a:ln w="12700" cap="flat" cmpd="sng" algn="ctr">
+          <a:solidFill>
+            <a:schemeClr val="phClr"/>
+          </a:solidFill>
+          <a:prstDash val="solid"/>
+          <a:miter lim="800000"/>
+        </a:ln>
+        <a:ln w="19050" cap="flat" cmpd="sng" algn="ctr">
+          <a:solidFill>
+            <a:schemeClr val="phClr"/>
+          </a:solidFill>
+          <a:prstDash val="solid"/>
+          <a:miter lim="800000"/>
+        </a:ln>
+      </a:lnStyleLst>
+      <a:effectStyleLst>
+        <a:effectStyle>
+          <a:effectLst/>
+        </a:effectStyle>
+        <a:effectStyle>
+          <a:effectLst/>
+        </a:effectStyle>
+        <a:effectStyle>
+          <a:effectLst>
+            <a:outerShdw blurRad="57150" dist="19050" dir="5400000" algn="ctr" rotWithShape="0">
+              <a:srgbClr val="000000">
+                <a:alpha val="63000"/>
+              </a:srgbClr>
+            </a:outerShdw>
+          </a:effectLst>
+        </a:effectStyle>
+      </a:effectStyleLst>
+      <a:bgFillStyleLst>
+        <a:solidFill>
+          <a:schemeClr val="phClr"/>
+        </a:solidFill>
+        <a:solidFill>
+          <a:schemeClr val="phClr">
+            <a:tint val="95000"/>
+            <a:satMod val="170000"/>
+          </a:schemeClr>
+        </a:solidFill>
+        <a:gradFill rotWithShape="1">
+          <a:gsLst>
+            <a:gs pos="0">
+              <a:schemeClr val="phClr">
+                <a:tint val="93000"/>
+                <a:satMod val="150000"/>
+                <a:shade val="98000"/>
+                <a:lumMod val="102000"/>
+              </a:schemeClr>
+            </a:gs>
+            <a:gs pos="50000">
+              <a:schemeClr val="phClr">
+                <a:tint val="98000"/>
+                <a:satMod val="130000"/>
+                <a:shade val="90000"/>
+                <a:lumMod val="103000"/>
+              </a:schemeClr>
+            </a:gs>
+            <a:gs pos="100000">
+              <a:schemeClr val="phClr">
+                <a:shade val="63000"/>
+                <a:satMod val="120000"/>
+              </a:schemeClr>
+            </a:gs>
+          </a:gsLst>
+          <a:lin ang="5400000" scaled="0"/>
+        </a:gradFill>
+      </a:bgFillStyleLst>
+    </a:fmtScheme>
+  </a:themeElements>
+  <a:objectDefaults/>
+  <a:extraClrSchemeLst/>
+  <a:extLst>
+    <a:ext uri="{05A4C25C-085E-4340-85A3-A5531E510DB2}">
+      <thm15:themeFamily xmlns:thm15="http://schemas.microsoft.com/office/thememl/2012/main" name="Office Theme" id="{62F939B6-93AF-4DB8-9C6B-D6C7DFDC589F}" vid="{4A3C46E8-61CC-4603-A589-7422A47A8E4A}"/>
+    </a:ext>
+  </a:extLst>
+</a:theme>
 </file>
</xml_diff>